<commit_message>
finish presentation before sdacha)
</commit_message>
<xml_diff>
--- a/docs/rpz/Presentation.pptx
+++ b/docs/rpz/Presentation.pptx
@@ -1,9 +1,12 @@
 
 <file path=ppt/presentation.xml><?xml version="1.0" encoding="utf-8"?>
-<p:presentation xmlns:a="http://schemas.openxmlformats.org/drawingml/2006/main" xmlns:r="http://schemas.openxmlformats.org/officeDocument/2006/relationships" xmlns:p="http://schemas.openxmlformats.org/presentationml/2006/main" saveSubsetFonts="1">
+<p:presentation xmlns:a="http://schemas.openxmlformats.org/drawingml/2006/main" xmlns:r="http://schemas.openxmlformats.org/officeDocument/2006/relationships" xmlns:p="http://schemas.openxmlformats.org/presentationml/2006/main" showSpecialPlsOnTitleSld="0" saveSubsetFonts="1">
   <p:sldMasterIdLst>
     <p:sldMasterId id="2147483677" r:id="rId1"/>
   </p:sldMasterIdLst>
+  <p:notesMasterIdLst>
+    <p:notesMasterId r:id="rId17"/>
+  </p:notesMasterIdLst>
   <p:sldIdLst>
     <p:sldId id="256" r:id="rId2"/>
     <p:sldId id="257" r:id="rId3"/>
@@ -11,15 +14,15 @@
     <p:sldId id="269" r:id="rId5"/>
     <p:sldId id="272" r:id="rId6"/>
     <p:sldId id="273" r:id="rId7"/>
-    <p:sldId id="274" r:id="rId8"/>
-    <p:sldId id="275" r:id="rId9"/>
-    <p:sldId id="277" r:id="rId10"/>
-    <p:sldId id="281" r:id="rId11"/>
-    <p:sldId id="282" r:id="rId12"/>
-    <p:sldId id="280" r:id="rId13"/>
-    <p:sldId id="278" r:id="rId14"/>
-    <p:sldId id="279" r:id="rId15"/>
-    <p:sldId id="268" r:id="rId16"/>
+    <p:sldId id="282" r:id="rId8"/>
+    <p:sldId id="274" r:id="rId9"/>
+    <p:sldId id="281" r:id="rId10"/>
+    <p:sldId id="275" r:id="rId11"/>
+    <p:sldId id="277" r:id="rId12"/>
+    <p:sldId id="278" r:id="rId13"/>
+    <p:sldId id="279" r:id="rId14"/>
+    <p:sldId id="268" r:id="rId15"/>
+    <p:sldId id="280" r:id="rId16"/>
   </p:sldIdLst>
   <p:sldSz cx="12192000" cy="6858000"/>
   <p:notesSz cx="6858000" cy="9144000"/>
@@ -126,6 +129,440 @@
 </p:presentation>
 </file>
 
+<file path=ppt/notesMasters/notesMaster1.xml><?xml version="1.0" encoding="utf-8"?>
+<p:notesMaster xmlns:a="http://schemas.openxmlformats.org/drawingml/2006/main" xmlns:r="http://schemas.openxmlformats.org/officeDocument/2006/relationships" xmlns:p="http://schemas.openxmlformats.org/presentationml/2006/main">
+  <p:cSld>
+    <p:bg>
+      <p:bgRef idx="1001">
+        <a:schemeClr val="bg1"/>
+      </p:bgRef>
+    </p:bg>
+    <p:spTree>
+      <p:nvGrpSpPr>
+        <p:cNvPr id="1" name=""/>
+        <p:cNvGrpSpPr/>
+        <p:nvPr/>
+      </p:nvGrpSpPr>
+      <p:grpSpPr>
+        <a:xfrm>
+          <a:off x="0" y="0"/>
+          <a:ext cx="0" cy="0"/>
+          <a:chOff x="0" y="0"/>
+          <a:chExt cx="0" cy="0"/>
+        </a:xfrm>
+      </p:grpSpPr>
+      <p:sp>
+        <p:nvSpPr>
+          <p:cNvPr id="2" name="Верхний колонтитул 1"/>
+          <p:cNvSpPr>
+            <a:spLocks noGrp="1"/>
+          </p:cNvSpPr>
+          <p:nvPr>
+            <p:ph type="hdr" sz="quarter"/>
+          </p:nvPr>
+        </p:nvSpPr>
+        <p:spPr>
+          <a:xfrm>
+            <a:off x="0" y="0"/>
+            <a:ext cx="2971800" cy="458788"/>
+          </a:xfrm>
+          <a:prstGeom prst="rect">
+            <a:avLst/>
+          </a:prstGeom>
+        </p:spPr>
+        <p:txBody>
+          <a:bodyPr vert="horz" lIns="91440" tIns="45720" rIns="91440" bIns="45720" rtlCol="0"/>
+          <a:lstStyle>
+            <a:lvl1pPr algn="l">
+              <a:defRPr sz="1200"/>
+            </a:lvl1pPr>
+          </a:lstStyle>
+          <a:p>
+            <a:endParaRPr lang="ru-RU"/>
+          </a:p>
+        </p:txBody>
+      </p:sp>
+      <p:sp>
+        <p:nvSpPr>
+          <p:cNvPr id="3" name="Дата 2"/>
+          <p:cNvSpPr>
+            <a:spLocks noGrp="1"/>
+          </p:cNvSpPr>
+          <p:nvPr>
+            <p:ph type="dt" idx="1"/>
+          </p:nvPr>
+        </p:nvSpPr>
+        <p:spPr>
+          <a:xfrm>
+            <a:off x="3884613" y="0"/>
+            <a:ext cx="2971800" cy="458788"/>
+          </a:xfrm>
+          <a:prstGeom prst="rect">
+            <a:avLst/>
+          </a:prstGeom>
+        </p:spPr>
+        <p:txBody>
+          <a:bodyPr vert="horz" lIns="91440" tIns="45720" rIns="91440" bIns="45720" rtlCol="0"/>
+          <a:lstStyle>
+            <a:lvl1pPr algn="r">
+              <a:defRPr sz="1200"/>
+            </a:lvl1pPr>
+          </a:lstStyle>
+          <a:p>
+            <a:fld id="{6E6D9DCE-A04C-4D8C-8931-135BCE43B3A4}" type="datetimeFigureOut">
+              <a:rPr lang="ru-RU" smtClean="0"/>
+              <a:t>12.02.2022</a:t>
+            </a:fld>
+            <a:endParaRPr lang="ru-RU"/>
+          </a:p>
+        </p:txBody>
+      </p:sp>
+      <p:sp>
+        <p:nvSpPr>
+          <p:cNvPr id="4" name="Образ слайда 3"/>
+          <p:cNvSpPr>
+            <a:spLocks noGrp="1" noRot="1" noChangeAspect="1"/>
+          </p:cNvSpPr>
+          <p:nvPr>
+            <p:ph type="sldImg" idx="2"/>
+          </p:nvPr>
+        </p:nvSpPr>
+        <p:spPr>
+          <a:xfrm>
+            <a:off x="685800" y="1143000"/>
+            <a:ext cx="5486400" cy="3086100"/>
+          </a:xfrm>
+          <a:prstGeom prst="rect">
+            <a:avLst/>
+          </a:prstGeom>
+          <a:noFill/>
+          <a:ln w="12700">
+            <a:solidFill>
+              <a:prstClr val="black"/>
+            </a:solidFill>
+          </a:ln>
+        </p:spPr>
+        <p:txBody>
+          <a:bodyPr vert="horz" lIns="91440" tIns="45720" rIns="91440" bIns="45720" rtlCol="0" anchor="ctr"/>
+          <a:lstStyle/>
+          <a:p>
+            <a:endParaRPr lang="ru-RU"/>
+          </a:p>
+        </p:txBody>
+      </p:sp>
+      <p:sp>
+        <p:nvSpPr>
+          <p:cNvPr id="5" name="Заметки 4"/>
+          <p:cNvSpPr>
+            <a:spLocks noGrp="1"/>
+          </p:cNvSpPr>
+          <p:nvPr>
+            <p:ph type="body" sz="quarter" idx="3"/>
+          </p:nvPr>
+        </p:nvSpPr>
+        <p:spPr>
+          <a:xfrm>
+            <a:off x="685800" y="4400550"/>
+            <a:ext cx="5486400" cy="3600450"/>
+          </a:xfrm>
+          <a:prstGeom prst="rect">
+            <a:avLst/>
+          </a:prstGeom>
+        </p:spPr>
+        <p:txBody>
+          <a:bodyPr vert="horz" lIns="91440" tIns="45720" rIns="91440" bIns="45720" rtlCol="0"/>
+          <a:lstStyle/>
+          <a:p>
+            <a:pPr lvl="0"/>
+            <a:r>
+              <a:rPr lang="ru-RU" smtClean="0"/>
+              <a:t>Образец текста</a:t>
+            </a:r>
+          </a:p>
+          <a:p>
+            <a:pPr lvl="1"/>
+            <a:r>
+              <a:rPr lang="ru-RU" smtClean="0"/>
+              <a:t>Второй уровень</a:t>
+            </a:r>
+          </a:p>
+          <a:p>
+            <a:pPr lvl="2"/>
+            <a:r>
+              <a:rPr lang="ru-RU" smtClean="0"/>
+              <a:t>Третий уровень</a:t>
+            </a:r>
+          </a:p>
+          <a:p>
+            <a:pPr lvl="3"/>
+            <a:r>
+              <a:rPr lang="ru-RU" smtClean="0"/>
+              <a:t>Четвертый уровень</a:t>
+            </a:r>
+          </a:p>
+          <a:p>
+            <a:pPr lvl="4"/>
+            <a:r>
+              <a:rPr lang="ru-RU" smtClean="0"/>
+              <a:t>Пятый уровень</a:t>
+            </a:r>
+            <a:endParaRPr lang="ru-RU"/>
+          </a:p>
+        </p:txBody>
+      </p:sp>
+      <p:sp>
+        <p:nvSpPr>
+          <p:cNvPr id="6" name="Нижний колонтитул 5"/>
+          <p:cNvSpPr>
+            <a:spLocks noGrp="1"/>
+          </p:cNvSpPr>
+          <p:nvPr>
+            <p:ph type="ftr" sz="quarter" idx="4"/>
+          </p:nvPr>
+        </p:nvSpPr>
+        <p:spPr>
+          <a:xfrm>
+            <a:off x="0" y="8685213"/>
+            <a:ext cx="2971800" cy="458787"/>
+          </a:xfrm>
+          <a:prstGeom prst="rect">
+            <a:avLst/>
+          </a:prstGeom>
+        </p:spPr>
+        <p:txBody>
+          <a:bodyPr vert="horz" lIns="91440" tIns="45720" rIns="91440" bIns="45720" rtlCol="0" anchor="b"/>
+          <a:lstStyle>
+            <a:lvl1pPr algn="l">
+              <a:defRPr sz="1200"/>
+            </a:lvl1pPr>
+          </a:lstStyle>
+          <a:p>
+            <a:endParaRPr lang="ru-RU"/>
+          </a:p>
+        </p:txBody>
+      </p:sp>
+      <p:sp>
+        <p:nvSpPr>
+          <p:cNvPr id="7" name="Номер слайда 6"/>
+          <p:cNvSpPr>
+            <a:spLocks noGrp="1"/>
+          </p:cNvSpPr>
+          <p:nvPr>
+            <p:ph type="sldNum" sz="quarter" idx="5"/>
+          </p:nvPr>
+        </p:nvSpPr>
+        <p:spPr>
+          <a:xfrm>
+            <a:off x="3884613" y="8685213"/>
+            <a:ext cx="2971800" cy="458787"/>
+          </a:xfrm>
+          <a:prstGeom prst="rect">
+            <a:avLst/>
+          </a:prstGeom>
+        </p:spPr>
+        <p:txBody>
+          <a:bodyPr vert="horz" lIns="91440" tIns="45720" rIns="91440" bIns="45720" rtlCol="0" anchor="b"/>
+          <a:lstStyle>
+            <a:lvl1pPr algn="r">
+              <a:defRPr sz="1200"/>
+            </a:lvl1pPr>
+          </a:lstStyle>
+          <a:p>
+            <a:fld id="{841BCF78-F948-464F-B373-3B426B09C22C}" type="slidenum">
+              <a:rPr lang="ru-RU" smtClean="0"/>
+              <a:t>‹#›</a:t>
+            </a:fld>
+            <a:endParaRPr lang="ru-RU"/>
+          </a:p>
+        </p:txBody>
+      </p:sp>
+    </p:spTree>
+    <p:extLst>
+      <p:ext uri="{BB962C8B-B14F-4D97-AF65-F5344CB8AC3E}">
+        <p14:creationId xmlns:p14="http://schemas.microsoft.com/office/powerpoint/2010/main" val="2643519068"/>
+      </p:ext>
+    </p:extLst>
+  </p:cSld>
+  <p:clrMap bg1="lt1" tx1="dk1" bg2="lt2" tx2="dk2" accent1="accent1" accent2="accent2" accent3="accent3" accent4="accent4" accent5="accent5" accent6="accent6" hlink="hlink" folHlink="folHlink"/>
+  <p:notesStyle>
+    <a:lvl1pPr marL="0" algn="l" defTabSz="914400" rtl="0" eaLnBrk="1" latinLnBrk="0" hangingPunct="1">
+      <a:defRPr sz="1200" kern="1200">
+        <a:solidFill>
+          <a:schemeClr val="tx1"/>
+        </a:solidFill>
+        <a:latin typeface="+mn-lt"/>
+        <a:ea typeface="+mn-ea"/>
+        <a:cs typeface="+mn-cs"/>
+      </a:defRPr>
+    </a:lvl1pPr>
+    <a:lvl2pPr marL="457200" algn="l" defTabSz="914400" rtl="0" eaLnBrk="1" latinLnBrk="0" hangingPunct="1">
+      <a:defRPr sz="1200" kern="1200">
+        <a:solidFill>
+          <a:schemeClr val="tx1"/>
+        </a:solidFill>
+        <a:latin typeface="+mn-lt"/>
+        <a:ea typeface="+mn-ea"/>
+        <a:cs typeface="+mn-cs"/>
+      </a:defRPr>
+    </a:lvl2pPr>
+    <a:lvl3pPr marL="914400" algn="l" defTabSz="914400" rtl="0" eaLnBrk="1" latinLnBrk="0" hangingPunct="1">
+      <a:defRPr sz="1200" kern="1200">
+        <a:solidFill>
+          <a:schemeClr val="tx1"/>
+        </a:solidFill>
+        <a:latin typeface="+mn-lt"/>
+        <a:ea typeface="+mn-ea"/>
+        <a:cs typeface="+mn-cs"/>
+      </a:defRPr>
+    </a:lvl3pPr>
+    <a:lvl4pPr marL="1371600" algn="l" defTabSz="914400" rtl="0" eaLnBrk="1" latinLnBrk="0" hangingPunct="1">
+      <a:defRPr sz="1200" kern="1200">
+        <a:solidFill>
+          <a:schemeClr val="tx1"/>
+        </a:solidFill>
+        <a:latin typeface="+mn-lt"/>
+        <a:ea typeface="+mn-ea"/>
+        <a:cs typeface="+mn-cs"/>
+      </a:defRPr>
+    </a:lvl4pPr>
+    <a:lvl5pPr marL="1828800" algn="l" defTabSz="914400" rtl="0" eaLnBrk="1" latinLnBrk="0" hangingPunct="1">
+      <a:defRPr sz="1200" kern="1200">
+        <a:solidFill>
+          <a:schemeClr val="tx1"/>
+        </a:solidFill>
+        <a:latin typeface="+mn-lt"/>
+        <a:ea typeface="+mn-ea"/>
+        <a:cs typeface="+mn-cs"/>
+      </a:defRPr>
+    </a:lvl5pPr>
+    <a:lvl6pPr marL="2286000" algn="l" defTabSz="914400" rtl="0" eaLnBrk="1" latinLnBrk="0" hangingPunct="1">
+      <a:defRPr sz="1200" kern="1200">
+        <a:solidFill>
+          <a:schemeClr val="tx1"/>
+        </a:solidFill>
+        <a:latin typeface="+mn-lt"/>
+        <a:ea typeface="+mn-ea"/>
+        <a:cs typeface="+mn-cs"/>
+      </a:defRPr>
+    </a:lvl6pPr>
+    <a:lvl7pPr marL="2743200" algn="l" defTabSz="914400" rtl="0" eaLnBrk="1" latinLnBrk="0" hangingPunct="1">
+      <a:defRPr sz="1200" kern="1200">
+        <a:solidFill>
+          <a:schemeClr val="tx1"/>
+        </a:solidFill>
+        <a:latin typeface="+mn-lt"/>
+        <a:ea typeface="+mn-ea"/>
+        <a:cs typeface="+mn-cs"/>
+      </a:defRPr>
+    </a:lvl7pPr>
+    <a:lvl8pPr marL="3200400" algn="l" defTabSz="914400" rtl="0" eaLnBrk="1" latinLnBrk="0" hangingPunct="1">
+      <a:defRPr sz="1200" kern="1200">
+        <a:solidFill>
+          <a:schemeClr val="tx1"/>
+        </a:solidFill>
+        <a:latin typeface="+mn-lt"/>
+        <a:ea typeface="+mn-ea"/>
+        <a:cs typeface="+mn-cs"/>
+      </a:defRPr>
+    </a:lvl8pPr>
+    <a:lvl9pPr marL="3657600" algn="l" defTabSz="914400" rtl="0" eaLnBrk="1" latinLnBrk="0" hangingPunct="1">
+      <a:defRPr sz="1200" kern="1200">
+        <a:solidFill>
+          <a:schemeClr val="tx1"/>
+        </a:solidFill>
+        <a:latin typeface="+mn-lt"/>
+        <a:ea typeface="+mn-ea"/>
+        <a:cs typeface="+mn-cs"/>
+      </a:defRPr>
+    </a:lvl9pPr>
+  </p:notesStyle>
+</p:notesMaster>
+</file>
+
+<file path=ppt/notesSlides/notesSlide1.xml><?xml version="1.0" encoding="utf-8"?>
+<p:notes xmlns:a="http://schemas.openxmlformats.org/drawingml/2006/main" xmlns:r="http://schemas.openxmlformats.org/officeDocument/2006/relationships" xmlns:p="http://schemas.openxmlformats.org/presentationml/2006/main">
+  <p:cSld>
+    <p:spTree>
+      <p:nvGrpSpPr>
+        <p:cNvPr id="1" name=""/>
+        <p:cNvGrpSpPr/>
+        <p:nvPr/>
+      </p:nvGrpSpPr>
+      <p:grpSpPr>
+        <a:xfrm>
+          <a:off x="0" y="0"/>
+          <a:ext cx="0" cy="0"/>
+          <a:chOff x="0" y="0"/>
+          <a:chExt cx="0" cy="0"/>
+        </a:xfrm>
+      </p:grpSpPr>
+      <p:sp>
+        <p:nvSpPr>
+          <p:cNvPr id="2" name="Образ слайда 1"/>
+          <p:cNvSpPr>
+            <a:spLocks noGrp="1" noRot="1" noChangeAspect="1"/>
+          </p:cNvSpPr>
+          <p:nvPr>
+            <p:ph type="sldImg"/>
+          </p:nvPr>
+        </p:nvSpPr>
+        <p:spPr/>
+      </p:sp>
+      <p:sp>
+        <p:nvSpPr>
+          <p:cNvPr id="3" name="Заметки 2"/>
+          <p:cNvSpPr>
+            <a:spLocks noGrp="1"/>
+          </p:cNvSpPr>
+          <p:nvPr>
+            <p:ph type="body" idx="1"/>
+          </p:nvPr>
+        </p:nvSpPr>
+        <p:spPr/>
+        <p:txBody>
+          <a:bodyPr/>
+          <a:lstStyle/>
+          <a:p>
+            <a:endParaRPr lang="ru-RU"/>
+          </a:p>
+        </p:txBody>
+      </p:sp>
+      <p:sp>
+        <p:nvSpPr>
+          <p:cNvPr id="4" name="Номер слайда 3"/>
+          <p:cNvSpPr>
+            <a:spLocks noGrp="1"/>
+          </p:cNvSpPr>
+          <p:nvPr>
+            <p:ph type="sldNum" sz="quarter" idx="10"/>
+          </p:nvPr>
+        </p:nvSpPr>
+        <p:spPr/>
+        <p:txBody>
+          <a:bodyPr/>
+          <a:lstStyle/>
+          <a:p>
+            <a:fld id="{841BCF78-F948-464F-B373-3B426B09C22C}" type="slidenum">
+              <a:rPr lang="ru-RU" smtClean="0"/>
+              <a:t>2</a:t>
+            </a:fld>
+            <a:endParaRPr lang="ru-RU"/>
+          </a:p>
+        </p:txBody>
+      </p:sp>
+    </p:spTree>
+    <p:extLst>
+      <p:ext uri="{BB962C8B-B14F-4D97-AF65-F5344CB8AC3E}">
+        <p14:creationId xmlns:p14="http://schemas.microsoft.com/office/powerpoint/2010/main" val="3719829284"/>
+      </p:ext>
+    </p:extLst>
+  </p:cSld>
+  <p:clrMapOvr>
+    <a:masterClrMapping/>
+  </p:clrMapOvr>
+</p:notes>
+</file>
+
 <file path=ppt/slideLayouts/slideLayout1.xml><?xml version="1.0" encoding="utf-8"?>
 <p:sldLayout xmlns:a="http://schemas.openxmlformats.org/drawingml/2006/main" xmlns:r="http://schemas.openxmlformats.org/officeDocument/2006/relationships" xmlns:p="http://schemas.openxmlformats.org/presentationml/2006/main" showMasterSp="0" type="title" preserve="1">
   <p:cSld name="Титульный слайд">
@@ -350,9 +787,9 @@
           <a:bodyPr/>
           <a:lstStyle/>
           <a:p>
-            <a:fld id="{60CD2B15-7750-49E5-A832-A778925714E3}" type="datetimeFigureOut">
+            <a:fld id="{03C8B24E-9072-4A63-9CF3-2091FBEE0926}" type="datetime1">
               <a:rPr lang="ru-RU" smtClean="0"/>
-              <a:t>11.02.2022</a:t>
+              <a:t>12.02.2022</a:t>
             </a:fld>
             <a:endParaRPr lang="ru-RU"/>
           </a:p>
@@ -558,9 +995,9 @@
           <a:bodyPr/>
           <a:lstStyle/>
           <a:p>
-            <a:fld id="{60CD2B15-7750-49E5-A832-A778925714E3}" type="datetimeFigureOut">
+            <a:fld id="{A2DF9016-3B0A-48DB-AA68-59A340F15C97}" type="datetime1">
               <a:rPr lang="ru-RU" smtClean="0"/>
-              <a:t>11.02.2022</a:t>
+              <a:t>12.02.2022</a:t>
             </a:fld>
             <a:endParaRPr lang="ru-RU"/>
           </a:p>
@@ -814,9 +1251,9 @@
           <a:bodyPr/>
           <a:lstStyle/>
           <a:p>
-            <a:fld id="{60CD2B15-7750-49E5-A832-A778925714E3}" type="datetimeFigureOut">
+            <a:fld id="{ED610CF0-5587-4445-8FAA-D1C14AACBF04}" type="datetime1">
               <a:rPr lang="ru-RU" smtClean="0"/>
-              <a:t>11.02.2022</a:t>
+              <a:t>12.02.2022</a:t>
             </a:fld>
             <a:endParaRPr lang="ru-RU"/>
           </a:p>
@@ -988,9 +1425,9 @@
           <a:bodyPr/>
           <a:lstStyle/>
           <a:p>
-            <a:fld id="{60CD2B15-7750-49E5-A832-A778925714E3}" type="datetimeFigureOut">
+            <a:fld id="{7D08D0F9-4486-4C0D-A4C3-9DF41EB36BAE}" type="datetime1">
               <a:rPr lang="ru-RU" smtClean="0"/>
-              <a:t>11.02.2022</a:t>
+              <a:t>12.02.2022</a:t>
             </a:fld>
             <a:endParaRPr lang="ru-RU"/>
           </a:p>
@@ -1331,9 +1768,9 @@
           <a:bodyPr/>
           <a:lstStyle/>
           <a:p>
-            <a:fld id="{60CD2B15-7750-49E5-A832-A778925714E3}" type="datetimeFigureOut">
+            <a:fld id="{DCBAD543-8B65-47C4-9868-AF907E0250FD}" type="datetime1">
               <a:rPr lang="ru-RU" smtClean="0"/>
-              <a:t>11.02.2022</a:t>
+              <a:t>12.02.2022</a:t>
             </a:fld>
             <a:endParaRPr lang="ru-RU"/>
           </a:p>
@@ -1606,9 +2043,9 @@
           <a:bodyPr/>
           <a:lstStyle/>
           <a:p>
-            <a:fld id="{60CD2B15-7750-49E5-A832-A778925714E3}" type="datetimeFigureOut">
+            <a:fld id="{D011704B-73F3-4C9F-8E51-784348AA7A81}" type="datetime1">
               <a:rPr lang="ru-RU" smtClean="0"/>
-              <a:t>11.02.2022</a:t>
+              <a:t>12.02.2022</a:t>
             </a:fld>
             <a:endParaRPr lang="ru-RU"/>
           </a:p>
@@ -1985,9 +2422,9 @@
           <a:bodyPr/>
           <a:lstStyle/>
           <a:p>
-            <a:fld id="{60CD2B15-7750-49E5-A832-A778925714E3}" type="datetimeFigureOut">
+            <a:fld id="{0ECF71ED-13A9-4254-AC52-66FE8A8F1C23}" type="datetime1">
               <a:rPr lang="ru-RU" smtClean="0"/>
-              <a:t>11.02.2022</a:t>
+              <a:t>12.02.2022</a:t>
             </a:fld>
             <a:endParaRPr lang="ru-RU"/>
           </a:p>
@@ -2103,9 +2540,9 @@
           <a:bodyPr/>
           <a:lstStyle/>
           <a:p>
-            <a:fld id="{60CD2B15-7750-49E5-A832-A778925714E3}" type="datetimeFigureOut">
+            <a:fld id="{D4D53A68-8569-454A-A05A-DDDF27B07A9D}" type="datetime1">
               <a:rPr lang="ru-RU" smtClean="0"/>
-              <a:t>11.02.2022</a:t>
+              <a:t>12.02.2022</a:t>
             </a:fld>
             <a:endParaRPr lang="ru-RU"/>
           </a:p>
@@ -2274,9 +2711,9 @@
           <a:bodyPr/>
           <a:lstStyle/>
           <a:p>
-            <a:fld id="{60CD2B15-7750-49E5-A832-A778925714E3}" type="datetimeFigureOut">
+            <a:fld id="{DEBD3B65-C67D-4788-8DD4-B5879859E161}" type="datetime1">
               <a:rPr lang="ru-RU" smtClean="0"/>
-              <a:t>11.02.2022</a:t>
+              <a:t>12.02.2022</a:t>
             </a:fld>
             <a:endParaRPr lang="ru-RU"/>
           </a:p>
@@ -2628,9 +3065,9 @@
             </a:lvl1pPr>
           </a:lstStyle>
           <a:p>
-            <a:fld id="{60CD2B15-7750-49E5-A832-A778925714E3}" type="datetimeFigureOut">
+            <a:fld id="{A7D08EAE-43AF-44C1-A7D9-E10A9ACFDA1E}" type="datetime1">
               <a:rPr lang="ru-RU" smtClean="0"/>
-              <a:t>11.02.2022</a:t>
+              <a:t>12.02.2022</a:t>
             </a:fld>
             <a:endParaRPr lang="ru-RU"/>
           </a:p>
@@ -3010,9 +3447,9 @@
           <a:bodyPr/>
           <a:lstStyle/>
           <a:p>
-            <a:fld id="{60CD2B15-7750-49E5-A832-A778925714E3}" type="datetimeFigureOut">
+            <a:fld id="{4AC49E42-2C28-4AEE-A493-6691E23865B3}" type="datetime1">
               <a:rPr lang="ru-RU" smtClean="0"/>
-              <a:t>11.02.2022</a:t>
+              <a:t>12.02.2022</a:t>
             </a:fld>
             <a:endParaRPr lang="ru-RU"/>
           </a:p>
@@ -3297,9 +3734,9 @@
             </a:lvl1pPr>
           </a:lstStyle>
           <a:p>
-            <a:fld id="{60CD2B15-7750-49E5-A832-A778925714E3}" type="datetimeFigureOut">
+            <a:fld id="{E56321EE-D23F-4780-B318-01CDAA890F27}" type="datetime1">
               <a:rPr lang="ru-RU" smtClean="0"/>
-              <a:t>11.02.2022</a:t>
+              <a:t>12.02.2022</a:t>
             </a:fld>
             <a:endParaRPr lang="ru-RU"/>
           </a:p>
@@ -3438,6 +3875,7 @@
     <p:sldLayoutId id="2147483687" r:id="rId10"/>
     <p:sldLayoutId id="2147483688" r:id="rId11"/>
   </p:sldLayoutIdLst>
+  <p:hf hdr="0" ftr="0" dt="0"/>
   <p:txStyles>
     <p:titleStyle>
       <a:lvl1pPr algn="l" defTabSz="914400" rtl="0" eaLnBrk="1" latinLnBrk="0" hangingPunct="1">
@@ -3847,10 +4285,18 @@
           <a:p>
             <a:pPr algn="ctr"/>
             <a:r>
-              <a:rPr lang="ru-RU" sz="5400" dirty="0" smtClean="0"/>
-              <a:t>Программа генерации ландшафта в дополненной реальности</a:t>
-            </a:r>
-            <a:endParaRPr lang="ru-RU" sz="5400" dirty="0"/>
+              <a:rPr lang="ru-RU" sz="4800" dirty="0" smtClean="0"/>
+              <a:t>Программа генерации</a:t>
+            </a:r>
+            <a:r>
+              <a:rPr lang="en-US" sz="4800" dirty="0" smtClean="0"/>
+              <a:t> </a:t>
+            </a:r>
+            <a:r>
+              <a:rPr lang="ru-RU" sz="4800" dirty="0" smtClean="0"/>
+              <a:t>трёхмерного ландшафта в дополненной реальности</a:t>
+            </a:r>
+            <a:endParaRPr lang="ru-RU" sz="4800" dirty="0"/>
           </a:p>
         </p:txBody>
       </p:sp>
@@ -4388,7 +4834,7 @@
                   <a:schemeClr val="tx1"/>
                 </a:solidFill>
               </a:rPr>
-              <a:t>Интерфейс программы (часть 2)</a:t>
+              <a:t>Структура комплекса программ</a:t>
             </a:r>
             <a:endParaRPr lang="ru-RU" dirty="0">
               <a:solidFill>
@@ -4400,169 +4846,44 @@
       </p:sp>
       <p:sp>
         <p:nvSpPr>
-          <p:cNvPr id="3" name="Объект 2"/>
-          <p:cNvSpPr>
-            <a:spLocks noGrp="1"/>
-          </p:cNvSpPr>
-          <p:nvPr>
-            <p:ph idx="1"/>
+          <p:cNvPr id="4" name="Номер слайда 3"/>
+          <p:cNvSpPr>
+            <a:spLocks noGrp="1"/>
+          </p:cNvSpPr>
+          <p:nvPr>
+            <p:ph type="sldNum" sz="quarter" idx="12"/>
           </p:nvPr>
         </p:nvSpPr>
         <p:spPr/>
         <p:txBody>
-          <a:bodyPr rIns="3600000">
-            <a:normAutofit/>
-          </a:bodyPr>
+          <a:bodyPr/>
           <a:lstStyle/>
           <a:p>
-            <a:pPr lvl="1"/>
-            <a:r>
-              <a:rPr lang="ru-RU" sz="2000" dirty="0" smtClean="0">
-                <a:solidFill>
-                  <a:schemeClr val="tx1"/>
-                </a:solidFill>
-              </a:rPr>
-              <a:t>группа </a:t>
-            </a:r>
-            <a:r>
-              <a:rPr lang="ru-RU" sz="2000" dirty="0">
-                <a:solidFill>
-                  <a:schemeClr val="tx1"/>
-                </a:solidFill>
-              </a:rPr>
-              <a:t>«Изменение видимой части» – позволяет сдвигать границы видимой части на заданные значения по осям </a:t>
-            </a:r>
-            <a:r>
-              <a:rPr lang="en-US" sz="2000" dirty="0">
-                <a:solidFill>
-                  <a:schemeClr val="tx1"/>
-                </a:solidFill>
-              </a:rPr>
-              <a:t>X </a:t>
-            </a:r>
-            <a:r>
-              <a:rPr lang="ru-RU" sz="2000" dirty="0">
-                <a:solidFill>
-                  <a:schemeClr val="tx1"/>
-                </a:solidFill>
-              </a:rPr>
-              <a:t>и </a:t>
-            </a:r>
-            <a:r>
-              <a:rPr lang="en-US" sz="2000" dirty="0">
-                <a:solidFill>
-                  <a:schemeClr val="tx1"/>
-                </a:solidFill>
-              </a:rPr>
-              <a:t>Y</a:t>
-            </a:r>
-            <a:r>
-              <a:rPr lang="ru-RU" sz="2000" dirty="0" smtClean="0">
-                <a:solidFill>
-                  <a:schemeClr val="tx1"/>
-                </a:solidFill>
-              </a:rPr>
-              <a:t>;</a:t>
-            </a:r>
-            <a:endParaRPr lang="en-US" sz="2000" dirty="0" smtClean="0">
-              <a:solidFill>
-                <a:schemeClr val="tx1"/>
-              </a:solidFill>
+            <a:fld id="{C4F09F00-B2EF-4E92-A50A-EB2934570B6C}" type="slidenum">
+              <a:rPr lang="ru-RU" sz="1800" smtClean="0">
+                <a:latin typeface="Times New Roman" panose="02020603050405020304" pitchFamily="18" charset="0"/>
+                <a:cs typeface="Times New Roman" panose="02020603050405020304" pitchFamily="18" charset="0"/>
+              </a:rPr>
+              <a:t>10</a:t>
+            </a:fld>
+            <a:endParaRPr lang="ru-RU" sz="1800" dirty="0">
+              <a:latin typeface="Times New Roman" panose="02020603050405020304" pitchFamily="18" charset="0"/>
+              <a:cs typeface="Times New Roman" panose="02020603050405020304" pitchFamily="18" charset="0"/>
             </a:endParaRPr>
-          </a:p>
-          <a:p>
-            <a:pPr lvl="1"/>
-            <a:r>
-              <a:rPr lang="ru-RU" sz="2000" dirty="0">
-                <a:solidFill>
-                  <a:schemeClr val="tx1"/>
-                </a:solidFill>
-              </a:rPr>
-              <a:t>группа «Поворот» – позволяет поворачивать на заданный градус модель ландшафта вокруг оси, перпендикулярной основанию модели;</a:t>
-            </a:r>
-          </a:p>
-          <a:p>
-            <a:pPr lvl="1"/>
-            <a:r>
-              <a:rPr lang="ru-RU" sz="2000" dirty="0">
-                <a:solidFill>
-                  <a:schemeClr val="tx1"/>
-                </a:solidFill>
-              </a:rPr>
-              <a:t>группа «Масштабирование видимой части» – позволяет масштабировать модель на заданные коэффициенты по осям </a:t>
-            </a:r>
-            <a:r>
-              <a:rPr lang="en-US" sz="2000" dirty="0">
-                <a:solidFill>
-                  <a:schemeClr val="tx1"/>
-                </a:solidFill>
-              </a:rPr>
-              <a:t>X</a:t>
-            </a:r>
-            <a:r>
-              <a:rPr lang="ru-RU" sz="2000" dirty="0">
-                <a:solidFill>
-                  <a:schemeClr val="tx1"/>
-                </a:solidFill>
-              </a:rPr>
-              <a:t>, </a:t>
-            </a:r>
-            <a:r>
-              <a:rPr lang="en-US" sz="2000" dirty="0">
-                <a:solidFill>
-                  <a:schemeClr val="tx1"/>
-                </a:solidFill>
-              </a:rPr>
-              <a:t>Y</a:t>
-            </a:r>
-            <a:r>
-              <a:rPr lang="ru-RU" sz="2000" dirty="0">
-                <a:solidFill>
-                  <a:schemeClr val="tx1"/>
-                </a:solidFill>
-              </a:rPr>
-              <a:t>, </a:t>
-            </a:r>
-            <a:r>
-              <a:rPr lang="en-US" sz="2000" dirty="0" smtClean="0">
-                <a:solidFill>
-                  <a:schemeClr val="tx1"/>
-                </a:solidFill>
-              </a:rPr>
-              <a:t>Z</a:t>
-            </a:r>
-            <a:r>
-              <a:rPr lang="en-US" sz="2000" dirty="0">
-                <a:solidFill>
-                  <a:schemeClr val="tx1"/>
-                </a:solidFill>
-              </a:rPr>
-              <a:t>.</a:t>
-            </a:r>
-            <a:endParaRPr lang="ru-RU" sz="2000" dirty="0">
-              <a:solidFill>
-                <a:schemeClr val="tx1"/>
-              </a:solidFill>
-            </a:endParaRPr>
-          </a:p>
-          <a:p>
-            <a:pPr lvl="1"/>
-            <a:endParaRPr lang="ru-RU" sz="1400" dirty="0"/>
-          </a:p>
-          <a:p>
-            <a:endParaRPr lang="ru-RU" dirty="0"/>
           </a:p>
         </p:txBody>
       </p:sp>
       <p:pic>
         <p:nvPicPr>
-          <p:cNvPr id="6" name="Рисунок 5"/>
+          <p:cNvPr id="8" name="Объект 7"/>
           <p:cNvPicPr>
-            <a:picLocks noChangeAspect="1"/>
+            <a:picLocks noGrp="1" noChangeAspect="1"/>
           </p:cNvPicPr>
-          <p:nvPr/>
+          <p:nvPr>
+            <p:ph idx="1"/>
+          </p:nvPr>
         </p:nvPicPr>
-        <p:blipFill rotWithShape="1">
+        <p:blipFill>
           <a:blip r:embed="rId2">
             <a:extLst>
               <a:ext uri="{28A0092B-C50C-407E-A947-70E740481C1C}">
@@ -4570,23 +4891,21 @@
               </a:ext>
             </a:extLst>
           </a:blip>
-          <a:srcRect r="51478"/>
-          <a:stretch/>
+          <a:stretch>
+            <a:fillRect/>
+          </a:stretch>
         </p:blipFill>
         <p:spPr>
           <a:xfrm>
-            <a:off x="7570817" y="1845734"/>
-            <a:ext cx="3584863" cy="3730289"/>
+            <a:off x="4116705" y="2200275"/>
+            <a:ext cx="4019550" cy="2114550"/>
           </a:xfrm>
-          <a:prstGeom prst="rect">
-            <a:avLst/>
-          </a:prstGeom>
         </p:spPr>
       </p:pic>
     </p:spTree>
     <p:extLst>
       <p:ext uri="{BB962C8B-B14F-4D97-AF65-F5344CB8AC3E}">
-        <p14:creationId xmlns:p14="http://schemas.microsoft.com/office/powerpoint/2010/main" val="1353504525"/>
+        <p14:creationId xmlns:p14="http://schemas.microsoft.com/office/powerpoint/2010/main" val="3400921614"/>
       </p:ext>
     </p:extLst>
   </p:cSld>
@@ -4634,7 +4953,7 @@
                   <a:schemeClr val="tx1"/>
                 </a:solidFill>
               </a:rPr>
-              <a:t>Интерфейс программы (часть 3)</a:t>
+              <a:t>Интерфейс программы</a:t>
             </a:r>
             <a:endParaRPr lang="ru-RU" dirty="0">
               <a:solidFill>
@@ -4662,85 +4981,55 @@
           <a:lstStyle/>
           <a:p>
             <a:pPr lvl="1"/>
-            <a:r>
-              <a:rPr lang="ru-RU" sz="2000" dirty="0" smtClean="0">
-                <a:solidFill>
-                  <a:schemeClr val="tx1"/>
-                </a:solidFill>
-              </a:rPr>
-              <a:t>группа </a:t>
-            </a:r>
-            <a:r>
-              <a:rPr lang="ru-RU" sz="2000" dirty="0">
-                <a:solidFill>
-                  <a:schemeClr val="tx1"/>
-                </a:solidFill>
-              </a:rPr>
-              <a:t>«Поворот источника света» – позволяет поворачивать источник света вокруг центра модели по осям </a:t>
-            </a:r>
-            <a:r>
-              <a:rPr lang="en-US" sz="2000" dirty="0">
-                <a:solidFill>
-                  <a:schemeClr val="tx1"/>
-                </a:solidFill>
-              </a:rPr>
-              <a:t>X</a:t>
-            </a:r>
-            <a:r>
-              <a:rPr lang="ru-RU" sz="2000" dirty="0">
-                <a:solidFill>
-                  <a:schemeClr val="tx1"/>
-                </a:solidFill>
-              </a:rPr>
-              <a:t>, </a:t>
-            </a:r>
-            <a:r>
-              <a:rPr lang="en-US" sz="2000" dirty="0">
-                <a:solidFill>
-                  <a:schemeClr val="tx1"/>
-                </a:solidFill>
-              </a:rPr>
-              <a:t>Y</a:t>
-            </a:r>
-            <a:r>
-              <a:rPr lang="ru-RU" sz="2000" dirty="0">
-                <a:solidFill>
-                  <a:schemeClr val="tx1"/>
-                </a:solidFill>
-              </a:rPr>
-              <a:t>, </a:t>
-            </a:r>
-            <a:r>
-              <a:rPr lang="en-US" sz="2000" dirty="0">
-                <a:solidFill>
-                  <a:schemeClr val="tx1"/>
-                </a:solidFill>
-              </a:rPr>
-              <a:t>Z</a:t>
-            </a:r>
-            <a:r>
-              <a:rPr lang="ru-RU" sz="2000" dirty="0">
-                <a:solidFill>
-                  <a:schemeClr val="tx1"/>
-                </a:solidFill>
-              </a:rPr>
-              <a:t>.</a:t>
-            </a:r>
+            <a:endParaRPr lang="ru-RU" sz="2000" dirty="0">
+              <a:solidFill>
+                <a:schemeClr val="tx1"/>
+              </a:solidFill>
+            </a:endParaRPr>
           </a:p>
           <a:p>
             <a:endParaRPr lang="ru-RU" dirty="0"/>
+          </a:p>
+        </p:txBody>
+      </p:sp>
+      <p:sp>
+        <p:nvSpPr>
+          <p:cNvPr id="4" name="Номер слайда 3"/>
+          <p:cNvSpPr>
+            <a:spLocks noGrp="1"/>
+          </p:cNvSpPr>
+          <p:nvPr>
+            <p:ph type="sldNum" sz="quarter" idx="12"/>
+          </p:nvPr>
+        </p:nvSpPr>
+        <p:spPr/>
+        <p:txBody>
+          <a:bodyPr/>
+          <a:lstStyle/>
+          <a:p>
+            <a:fld id="{C4F09F00-B2EF-4E92-A50A-EB2934570B6C}" type="slidenum">
+              <a:rPr lang="ru-RU" sz="1800" smtClean="0">
+                <a:latin typeface="Times New Roman" panose="02020603050405020304" pitchFamily="18" charset="0"/>
+                <a:cs typeface="Times New Roman" panose="02020603050405020304" pitchFamily="18" charset="0"/>
+              </a:rPr>
+              <a:t>11</a:t>
+            </a:fld>
+            <a:endParaRPr lang="ru-RU" sz="1800" dirty="0">
+              <a:latin typeface="Times New Roman" panose="02020603050405020304" pitchFamily="18" charset="0"/>
+              <a:cs typeface="Times New Roman" panose="02020603050405020304" pitchFamily="18" charset="0"/>
+            </a:endParaRPr>
           </a:p>
         </p:txBody>
       </p:sp>
       <p:pic>
         <p:nvPicPr>
-          <p:cNvPr id="6" name="Рисунок 5"/>
+          <p:cNvPr id="5" name="Рисунок 4"/>
           <p:cNvPicPr>
             <a:picLocks noChangeAspect="1"/>
           </p:cNvPicPr>
           <p:nvPr/>
         </p:nvPicPr>
-        <p:blipFill rotWithShape="1">
+        <p:blipFill>
           <a:blip r:embed="rId2">
             <a:extLst>
               <a:ext uri="{28A0092B-C50C-407E-A947-70E740481C1C}">
@@ -4748,13 +5037,14 @@
               </a:ext>
             </a:extLst>
           </a:blip>
-          <a:srcRect r="51478"/>
-          <a:stretch/>
+          <a:stretch>
+            <a:fillRect/>
+          </a:stretch>
         </p:blipFill>
         <p:spPr>
           <a:xfrm>
-            <a:off x="7570817" y="1845734"/>
-            <a:ext cx="3584863" cy="3730289"/>
+            <a:off x="2233931" y="1921961"/>
+            <a:ext cx="7666527" cy="3870906"/>
           </a:xfrm>
           <a:prstGeom prst="rect">
             <a:avLst/>
@@ -4764,7 +5054,7 @@
     </p:spTree>
     <p:extLst>
       <p:ext uri="{BB962C8B-B14F-4D97-AF65-F5344CB8AC3E}">
-        <p14:creationId xmlns:p14="http://schemas.microsoft.com/office/powerpoint/2010/main" val="1574337942"/>
+        <p14:creationId xmlns:p14="http://schemas.microsoft.com/office/powerpoint/2010/main" val="2313457748"/>
       </p:ext>
     </p:extLst>
   </p:cSld>
@@ -4813,186 +5103,6 @@
                 </a:solidFill>
               </a:rPr>
               <a:t>Демонстрация работоспособности ПО</a:t>
-            </a:r>
-            <a:endParaRPr lang="ru-RU" dirty="0">
-              <a:solidFill>
-                <a:schemeClr val="tx1"/>
-              </a:solidFill>
-            </a:endParaRPr>
-          </a:p>
-        </p:txBody>
-      </p:sp>
-      <p:pic>
-        <p:nvPicPr>
-          <p:cNvPr id="4" name="Объект 3"/>
-          <p:cNvPicPr>
-            <a:picLocks noGrp="1" noChangeAspect="1"/>
-          </p:cNvPicPr>
-          <p:nvPr>
-            <p:ph idx="1"/>
-          </p:nvPr>
-        </p:nvPicPr>
-        <p:blipFill>
-          <a:blip r:embed="rId2" cstate="print">
-            <a:extLst>
-              <a:ext uri="{28A0092B-C50C-407E-A947-70E740481C1C}">
-                <a14:useLocalDpi xmlns:a14="http://schemas.microsoft.com/office/drawing/2010/main" val="0"/>
-              </a:ext>
-            </a:extLst>
-          </a:blip>
-          <a:stretch>
-            <a:fillRect/>
-          </a:stretch>
-        </p:blipFill>
-        <p:spPr>
-          <a:xfrm>
-            <a:off x="1097280" y="1802203"/>
-            <a:ext cx="4285211" cy="2163645"/>
-          </a:xfrm>
-        </p:spPr>
-      </p:pic>
-      <p:pic>
-        <p:nvPicPr>
-          <p:cNvPr id="5" name="Рисунок 4"/>
-          <p:cNvPicPr>
-            <a:picLocks noChangeAspect="1"/>
-          </p:cNvPicPr>
-          <p:nvPr/>
-        </p:nvPicPr>
-        <p:blipFill>
-          <a:blip r:embed="rId3" cstate="print">
-            <a:extLst>
-              <a:ext uri="{28A0092B-C50C-407E-A947-70E740481C1C}">
-                <a14:useLocalDpi xmlns:a14="http://schemas.microsoft.com/office/drawing/2010/main" val="0"/>
-              </a:ext>
-            </a:extLst>
-          </a:blip>
-          <a:stretch>
-            <a:fillRect/>
-          </a:stretch>
-        </p:blipFill>
-        <p:spPr>
-          <a:xfrm>
-            <a:off x="6868390" y="1801153"/>
-            <a:ext cx="4287289" cy="2164695"/>
-          </a:xfrm>
-          <a:prstGeom prst="rect">
-            <a:avLst/>
-          </a:prstGeom>
-        </p:spPr>
-      </p:pic>
-      <p:pic>
-        <p:nvPicPr>
-          <p:cNvPr id="6" name="Рисунок 5"/>
-          <p:cNvPicPr>
-            <a:picLocks noChangeAspect="1"/>
-          </p:cNvPicPr>
-          <p:nvPr/>
-        </p:nvPicPr>
-        <p:blipFill>
-          <a:blip r:embed="rId4" cstate="print">
-            <a:extLst>
-              <a:ext uri="{28A0092B-C50C-407E-A947-70E740481C1C}">
-                <a14:useLocalDpi xmlns:a14="http://schemas.microsoft.com/office/drawing/2010/main" val="0"/>
-              </a:ext>
-            </a:extLst>
-          </a:blip>
-          <a:stretch>
-            <a:fillRect/>
-          </a:stretch>
-        </p:blipFill>
-        <p:spPr>
-          <a:xfrm>
-            <a:off x="1097280" y="4030691"/>
-            <a:ext cx="4285211" cy="2163646"/>
-          </a:xfrm>
-          <a:prstGeom prst="rect">
-            <a:avLst/>
-          </a:prstGeom>
-        </p:spPr>
-      </p:pic>
-      <p:pic>
-        <p:nvPicPr>
-          <p:cNvPr id="7" name="Рисунок 6"/>
-          <p:cNvPicPr>
-            <a:picLocks noChangeAspect="1"/>
-          </p:cNvPicPr>
-          <p:nvPr/>
-        </p:nvPicPr>
-        <p:blipFill>
-          <a:blip r:embed="rId5" cstate="print">
-            <a:extLst>
-              <a:ext uri="{28A0092B-C50C-407E-A947-70E740481C1C}">
-                <a14:useLocalDpi xmlns:a14="http://schemas.microsoft.com/office/drawing/2010/main" val="0"/>
-              </a:ext>
-            </a:extLst>
-          </a:blip>
-          <a:stretch>
-            <a:fillRect/>
-          </a:stretch>
-        </p:blipFill>
-        <p:spPr>
-          <a:xfrm>
-            <a:off x="6868389" y="4030166"/>
-            <a:ext cx="4287289" cy="2164695"/>
-          </a:xfrm>
-          <a:prstGeom prst="rect">
-            <a:avLst/>
-          </a:prstGeom>
-        </p:spPr>
-      </p:pic>
-    </p:spTree>
-    <p:extLst>
-      <p:ext uri="{BB962C8B-B14F-4D97-AF65-F5344CB8AC3E}">
-        <p14:creationId xmlns:p14="http://schemas.microsoft.com/office/powerpoint/2010/main" val="3906518286"/>
-      </p:ext>
-    </p:extLst>
-  </p:cSld>
-  <p:clrMapOvr>
-    <a:masterClrMapping/>
-  </p:clrMapOvr>
-</p:sld>
-</file>
-
-<file path=ppt/slides/slide13.xml><?xml version="1.0" encoding="utf-8"?>
-<p:sld xmlns:a="http://schemas.openxmlformats.org/drawingml/2006/main" xmlns:r="http://schemas.openxmlformats.org/officeDocument/2006/relationships" xmlns:p="http://schemas.openxmlformats.org/presentationml/2006/main">
-  <p:cSld>
-    <p:spTree>
-      <p:nvGrpSpPr>
-        <p:cNvPr id="1" name=""/>
-        <p:cNvGrpSpPr/>
-        <p:nvPr/>
-      </p:nvGrpSpPr>
-      <p:grpSpPr>
-        <a:xfrm>
-          <a:off x="0" y="0"/>
-          <a:ext cx="0" cy="0"/>
-          <a:chOff x="0" y="0"/>
-          <a:chExt cx="0" cy="0"/>
-        </a:xfrm>
-      </p:grpSpPr>
-      <p:sp>
-        <p:nvSpPr>
-          <p:cNvPr id="2" name="Заголовок 1"/>
-          <p:cNvSpPr>
-            <a:spLocks noGrp="1"/>
-          </p:cNvSpPr>
-          <p:nvPr>
-            <p:ph type="title"/>
-          </p:nvPr>
-        </p:nvSpPr>
-        <p:spPr/>
-        <p:txBody>
-          <a:bodyPr/>
-          <a:lstStyle/>
-          <a:p>
-            <a:r>
-              <a:rPr lang="ru-RU" dirty="0" smtClean="0">
-                <a:solidFill>
-                  <a:schemeClr val="tx1"/>
-                </a:solidFill>
-              </a:rPr>
-              <a:t>Демонстрация работоспособности ПО (продолжение)</a:t>
             </a:r>
             <a:endParaRPr lang="ru-RU" dirty="0">
               <a:solidFill>
@@ -5121,10 +5231,181 @@
           </a:prstGeom>
         </p:spPr>
       </p:pic>
+      <p:sp>
+        <p:nvSpPr>
+          <p:cNvPr id="3" name="Номер слайда 2"/>
+          <p:cNvSpPr>
+            <a:spLocks noGrp="1"/>
+          </p:cNvSpPr>
+          <p:nvPr>
+            <p:ph type="sldNum" sz="quarter" idx="12"/>
+          </p:nvPr>
+        </p:nvSpPr>
+        <p:spPr/>
+        <p:txBody>
+          <a:bodyPr/>
+          <a:lstStyle/>
+          <a:p>
+            <a:fld id="{C4F09F00-B2EF-4E92-A50A-EB2934570B6C}" type="slidenum">
+              <a:rPr lang="ru-RU" sz="1800" smtClean="0">
+                <a:latin typeface="Times New Roman" panose="02020603050405020304" pitchFamily="18" charset="0"/>
+                <a:cs typeface="Times New Roman" panose="02020603050405020304" pitchFamily="18" charset="0"/>
+              </a:rPr>
+              <a:t>12</a:t>
+            </a:fld>
+            <a:endParaRPr lang="ru-RU" dirty="0">
+              <a:latin typeface="Times New Roman" panose="02020603050405020304" pitchFamily="18" charset="0"/>
+              <a:cs typeface="Times New Roman" panose="02020603050405020304" pitchFamily="18" charset="0"/>
+            </a:endParaRPr>
+          </a:p>
+        </p:txBody>
+      </p:sp>
     </p:spTree>
     <p:extLst>
       <p:ext uri="{BB962C8B-B14F-4D97-AF65-F5344CB8AC3E}">
         <p14:creationId xmlns:p14="http://schemas.microsoft.com/office/powerpoint/2010/main" val="3514144722"/>
+      </p:ext>
+    </p:extLst>
+  </p:cSld>
+  <p:clrMapOvr>
+    <a:masterClrMapping/>
+  </p:clrMapOvr>
+</p:sld>
+</file>
+
+<file path=ppt/slides/slide13.xml><?xml version="1.0" encoding="utf-8"?>
+<p:sld xmlns:a="http://schemas.openxmlformats.org/drawingml/2006/main" xmlns:r="http://schemas.openxmlformats.org/officeDocument/2006/relationships" xmlns:p="http://schemas.openxmlformats.org/presentationml/2006/main">
+  <p:cSld>
+    <p:spTree>
+      <p:nvGrpSpPr>
+        <p:cNvPr id="1" name=""/>
+        <p:cNvGrpSpPr/>
+        <p:nvPr/>
+      </p:nvGrpSpPr>
+      <p:grpSpPr>
+        <a:xfrm>
+          <a:off x="0" y="0"/>
+          <a:ext cx="0" cy="0"/>
+          <a:chOff x="0" y="0"/>
+          <a:chExt cx="0" cy="0"/>
+        </a:xfrm>
+      </p:grpSpPr>
+      <p:sp>
+        <p:nvSpPr>
+          <p:cNvPr id="2" name="Заголовок 1"/>
+          <p:cNvSpPr>
+            <a:spLocks noGrp="1"/>
+          </p:cNvSpPr>
+          <p:nvPr>
+            <p:ph type="title"/>
+          </p:nvPr>
+        </p:nvSpPr>
+        <p:spPr/>
+        <p:txBody>
+          <a:bodyPr/>
+          <a:lstStyle/>
+          <a:p>
+            <a:r>
+              <a:rPr lang="ru-RU" dirty="0" smtClean="0">
+                <a:solidFill>
+                  <a:schemeClr val="tx1"/>
+                </a:solidFill>
+              </a:rPr>
+              <a:t>Результаты исследований</a:t>
+            </a:r>
+            <a:endParaRPr lang="ru-RU" dirty="0">
+              <a:solidFill>
+                <a:schemeClr val="tx1"/>
+              </a:solidFill>
+            </a:endParaRPr>
+          </a:p>
+        </p:txBody>
+      </p:sp>
+      <p:sp>
+        <p:nvSpPr>
+          <p:cNvPr id="3" name="Объект 2"/>
+          <p:cNvSpPr>
+            <a:spLocks noGrp="1"/>
+          </p:cNvSpPr>
+          <p:nvPr>
+            <p:ph idx="1"/>
+          </p:nvPr>
+        </p:nvSpPr>
+        <p:spPr/>
+        <p:txBody>
+          <a:bodyPr/>
+          <a:lstStyle/>
+          <a:p>
+            <a:pPr marL="0" indent="0">
+              <a:buNone/>
+            </a:pPr>
+            <a:endParaRPr lang="ru-RU" dirty="0"/>
+          </a:p>
+        </p:txBody>
+      </p:sp>
+      <p:pic>
+        <p:nvPicPr>
+          <p:cNvPr id="4" name="Рисунок 3"/>
+          <p:cNvPicPr>
+            <a:picLocks noChangeAspect="1"/>
+          </p:cNvPicPr>
+          <p:nvPr/>
+        </p:nvPicPr>
+        <p:blipFill>
+          <a:blip r:embed="rId2">
+            <a:extLst>
+              <a:ext uri="{28A0092B-C50C-407E-A947-70E740481C1C}">
+                <a14:useLocalDpi xmlns:a14="http://schemas.microsoft.com/office/drawing/2010/main" val="0"/>
+              </a:ext>
+            </a:extLst>
+          </a:blip>
+          <a:stretch>
+            <a:fillRect/>
+          </a:stretch>
+        </p:blipFill>
+        <p:spPr>
+          <a:xfrm>
+            <a:off x="1097280" y="1845734"/>
+            <a:ext cx="10058400" cy="3451059"/>
+          </a:xfrm>
+          <a:prstGeom prst="rect">
+            <a:avLst/>
+          </a:prstGeom>
+        </p:spPr>
+      </p:pic>
+      <p:sp>
+        <p:nvSpPr>
+          <p:cNvPr id="5" name="Номер слайда 4"/>
+          <p:cNvSpPr>
+            <a:spLocks noGrp="1"/>
+          </p:cNvSpPr>
+          <p:nvPr>
+            <p:ph type="sldNum" sz="quarter" idx="12"/>
+          </p:nvPr>
+        </p:nvSpPr>
+        <p:spPr/>
+        <p:txBody>
+          <a:bodyPr/>
+          <a:lstStyle/>
+          <a:p>
+            <a:fld id="{C4F09F00-B2EF-4E92-A50A-EB2934570B6C}" type="slidenum">
+              <a:rPr lang="ru-RU" sz="1800" smtClean="0">
+                <a:latin typeface="Times New Roman" panose="02020603050405020304" pitchFamily="18" charset="0"/>
+                <a:cs typeface="Times New Roman" panose="02020603050405020304" pitchFamily="18" charset="0"/>
+              </a:rPr>
+              <a:t>13</a:t>
+            </a:fld>
+            <a:endParaRPr lang="ru-RU" dirty="0">
+              <a:latin typeface="Times New Roman" panose="02020603050405020304" pitchFamily="18" charset="0"/>
+              <a:cs typeface="Times New Roman" panose="02020603050405020304" pitchFamily="18" charset="0"/>
+            </a:endParaRPr>
+          </a:p>
+        </p:txBody>
+      </p:sp>
+    </p:spTree>
+    <p:extLst>
+      <p:ext uri="{BB962C8B-B14F-4D97-AF65-F5344CB8AC3E}">
+        <p14:creationId xmlns:p14="http://schemas.microsoft.com/office/powerpoint/2010/main" val="2763502521"/>
       </p:ext>
     </p:extLst>
   </p:cSld>
@@ -5172,7 +5453,7 @@
                   <a:schemeClr val="tx1"/>
                 </a:solidFill>
               </a:rPr>
-              <a:t>Результаты исследований</a:t>
+              <a:t>Заключение</a:t>
             </a:r>
             <a:endParaRPr lang="ru-RU" dirty="0">
               <a:solidFill>
@@ -5197,54 +5478,186 @@
           <a:bodyPr/>
           <a:lstStyle/>
           <a:p>
+            <a:pPr lvl="1" algn="just">
+              <a:buFont typeface="Arial" panose="020B0604020202020204" pitchFamily="34" charset="0"/>
+              <a:buChar char="•"/>
+            </a:pPr>
             <a:r>
               <a:rPr lang="ru-RU" dirty="0" smtClean="0">
                 <a:solidFill>
                   <a:schemeClr val="tx1"/>
                 </a:solidFill>
               </a:rPr>
-              <a:t>Ниже приведены результаты исследования зависимости времени вычисления изображения ландшафта от её площади с обработкой и без обработки теней</a:t>
-            </a:r>
-          </a:p>
-          <a:p>
-            <a:endParaRPr lang="ru-RU" dirty="0"/>
-          </a:p>
-        </p:txBody>
-      </p:sp>
-      <p:pic>
-        <p:nvPicPr>
-          <p:cNvPr id="4" name="Рисунок 3"/>
-          <p:cNvPicPr>
-            <a:picLocks noChangeAspect="1"/>
-          </p:cNvPicPr>
-          <p:nvPr/>
-        </p:nvPicPr>
-        <p:blipFill>
-          <a:blip r:embed="rId2">
-            <a:extLst>
-              <a:ext uri="{28A0092B-C50C-407E-A947-70E740481C1C}">
-                <a14:useLocalDpi xmlns:a14="http://schemas.microsoft.com/office/drawing/2010/main" val="0"/>
-              </a:ext>
-            </a:extLst>
-          </a:blip>
-          <a:stretch>
-            <a:fillRect/>
-          </a:stretch>
-        </p:blipFill>
-        <p:spPr>
-          <a:xfrm>
-            <a:off x="1097280" y="2418035"/>
-            <a:ext cx="10058400" cy="3451059"/>
-          </a:xfrm>
-          <a:prstGeom prst="rect">
-            <a:avLst/>
-          </a:prstGeom>
-        </p:spPr>
-      </p:pic>
+              <a:t>Формализованы </a:t>
+            </a:r>
+            <a:r>
+              <a:rPr lang="ru-RU" dirty="0">
+                <a:solidFill>
+                  <a:schemeClr val="tx1"/>
+                </a:solidFill>
+              </a:rPr>
+              <a:t>объекты синтезируемой сцены и преобразования над </a:t>
+            </a:r>
+            <a:r>
+              <a:rPr lang="ru-RU" dirty="0" smtClean="0">
+                <a:solidFill>
+                  <a:schemeClr val="tx1"/>
+                </a:solidFill>
+              </a:rPr>
+              <a:t>ней.</a:t>
+            </a:r>
+            <a:endParaRPr lang="ru-RU" dirty="0">
+              <a:solidFill>
+                <a:schemeClr val="tx1"/>
+              </a:solidFill>
+            </a:endParaRPr>
+          </a:p>
+          <a:p>
+            <a:pPr lvl="1" algn="just">
+              <a:buFont typeface="Arial" panose="020B0604020202020204" pitchFamily="34" charset="0"/>
+              <a:buChar char="•"/>
+            </a:pPr>
+            <a:r>
+              <a:rPr lang="ru-RU" dirty="0" smtClean="0">
+                <a:solidFill>
+                  <a:schemeClr val="tx1"/>
+                </a:solidFill>
+              </a:rPr>
+              <a:t>Проведён </a:t>
+            </a:r>
+            <a:r>
+              <a:rPr lang="ru-RU" dirty="0">
+                <a:solidFill>
+                  <a:schemeClr val="tx1"/>
+                </a:solidFill>
+              </a:rPr>
+              <a:t>анализ существующих алгоритмов синтеза ландшафта и отображения виртуальной сцены в дополненной реальности, </a:t>
+            </a:r>
+            <a:r>
+              <a:rPr lang="ru-RU" dirty="0" smtClean="0">
+                <a:solidFill>
+                  <a:schemeClr val="tx1"/>
+                </a:solidFill>
+              </a:rPr>
+              <a:t>обоснована </a:t>
+            </a:r>
+            <a:r>
+              <a:rPr lang="ru-RU" dirty="0">
+                <a:solidFill>
+                  <a:schemeClr val="tx1"/>
+                </a:solidFill>
+              </a:rPr>
+              <a:t>оптимальность выбранных </a:t>
+            </a:r>
+            <a:r>
+              <a:rPr lang="ru-RU" dirty="0" smtClean="0">
+                <a:solidFill>
+                  <a:schemeClr val="tx1"/>
+                </a:solidFill>
+              </a:rPr>
+              <a:t>алгоритмов</a:t>
+            </a:r>
+            <a:r>
+              <a:rPr lang="ru-RU" dirty="0">
+                <a:solidFill>
+                  <a:schemeClr val="tx1"/>
+                </a:solidFill>
+              </a:rPr>
+              <a:t>.</a:t>
+            </a:r>
+          </a:p>
+          <a:p>
+            <a:pPr lvl="1" algn="just">
+              <a:buFont typeface="Arial" panose="020B0604020202020204" pitchFamily="34" charset="0"/>
+              <a:buChar char="•"/>
+            </a:pPr>
+            <a:r>
+              <a:rPr lang="ru-RU" dirty="0" smtClean="0">
+                <a:solidFill>
+                  <a:schemeClr val="tx1"/>
+                </a:solidFill>
+              </a:rPr>
+              <a:t>Реализованы </a:t>
+            </a:r>
+            <a:r>
+              <a:rPr lang="ru-RU" dirty="0">
+                <a:solidFill>
+                  <a:schemeClr val="tx1"/>
+                </a:solidFill>
+              </a:rPr>
+              <a:t>выбранные </a:t>
+            </a:r>
+            <a:r>
+              <a:rPr lang="ru-RU" dirty="0" smtClean="0">
+                <a:solidFill>
+                  <a:schemeClr val="tx1"/>
+                </a:solidFill>
+              </a:rPr>
+              <a:t>алгоритмы.</a:t>
+            </a:r>
+            <a:endParaRPr lang="ru-RU" dirty="0">
+              <a:solidFill>
+                <a:schemeClr val="tx1"/>
+              </a:solidFill>
+            </a:endParaRPr>
+          </a:p>
+          <a:p>
+            <a:pPr lvl="1" algn="just">
+              <a:buFont typeface="Arial" panose="020B0604020202020204" pitchFamily="34" charset="0"/>
+              <a:buChar char="•"/>
+            </a:pPr>
+            <a:r>
+              <a:rPr lang="ru-RU" dirty="0" smtClean="0">
+                <a:solidFill>
+                  <a:schemeClr val="tx1"/>
+                </a:solidFill>
+              </a:rPr>
+              <a:t>Разработан </a:t>
+            </a:r>
+            <a:r>
+              <a:rPr lang="ru-RU" dirty="0">
+                <a:solidFill>
+                  <a:schemeClr val="tx1"/>
+                </a:solidFill>
+              </a:rPr>
+              <a:t>программный продукт для визуализации и преобразования виртуальной сцены в дополненной реальности.</a:t>
+            </a:r>
+          </a:p>
+        </p:txBody>
+      </p:sp>
+      <p:sp>
+        <p:nvSpPr>
+          <p:cNvPr id="4" name="Номер слайда 3"/>
+          <p:cNvSpPr>
+            <a:spLocks noGrp="1"/>
+          </p:cNvSpPr>
+          <p:nvPr>
+            <p:ph type="sldNum" sz="quarter" idx="12"/>
+          </p:nvPr>
+        </p:nvSpPr>
+        <p:spPr/>
+        <p:txBody>
+          <a:bodyPr/>
+          <a:lstStyle/>
+          <a:p>
+            <a:fld id="{C4F09F00-B2EF-4E92-A50A-EB2934570B6C}" type="slidenum">
+              <a:rPr lang="ru-RU" sz="1800" smtClean="0">
+                <a:latin typeface="Times New Roman" panose="02020603050405020304" pitchFamily="18" charset="0"/>
+                <a:cs typeface="Times New Roman" panose="02020603050405020304" pitchFamily="18" charset="0"/>
+              </a:rPr>
+              <a:t>14</a:t>
+            </a:fld>
+            <a:endParaRPr lang="ru-RU" dirty="0">
+              <a:latin typeface="Times New Roman" panose="02020603050405020304" pitchFamily="18" charset="0"/>
+              <a:cs typeface="Times New Roman" panose="02020603050405020304" pitchFamily="18" charset="0"/>
+            </a:endParaRPr>
+          </a:p>
+        </p:txBody>
+      </p:sp>
     </p:spTree>
     <p:extLst>
       <p:ext uri="{BB962C8B-B14F-4D97-AF65-F5344CB8AC3E}">
-        <p14:creationId xmlns:p14="http://schemas.microsoft.com/office/powerpoint/2010/main" val="2763502521"/>
+        <p14:creationId xmlns:p14="http://schemas.microsoft.com/office/powerpoint/2010/main" val="990386606"/>
       </p:ext>
     </p:extLst>
   </p:cSld>
@@ -5292,7 +5705,7 @@
                   <a:schemeClr val="tx1"/>
                 </a:solidFill>
               </a:rPr>
-              <a:t>Заключение</a:t>
+              <a:t>Развитие проекта</a:t>
             </a:r>
             <a:endParaRPr lang="ru-RU" dirty="0">
               <a:solidFill>
@@ -5317,11 +5730,11 @@
           <a:bodyPr/>
           <a:lstStyle/>
           <a:p>
-            <a:pPr lvl="1">
+            <a:pPr lvl="1" algn="just">
               <a:buFont typeface="Arial" panose="020B0604020202020204" pitchFamily="34" charset="0"/>
               <a:buChar char="•"/>
             </a:pPr>
-            <a:endParaRPr lang="ru-RU" dirty="0" smtClean="0">
+            <a:endParaRPr lang="ru-RU" sz="2000" dirty="0" smtClean="0">
               <a:solidFill>
                 <a:schemeClr val="tx1"/>
               </a:solidFill>
@@ -5332,14 +5745,6 @@
               <a:buFont typeface="Arial" panose="020B0604020202020204" pitchFamily="34" charset="0"/>
               <a:buChar char="•"/>
             </a:pPr>
-            <a:r>
-              <a:rPr lang="ru-RU" sz="2000" dirty="0" smtClean="0">
-                <a:solidFill>
-                  <a:schemeClr val="tx1"/>
-                </a:solidFill>
-              </a:rPr>
-              <a:t>Выполнен курсовой проект, в котором была реализована программа для генерации ландшафта в дополненной реальности с использованием алгоритмов компьютерной графики и маркерной технологии дополненной реальности.</a:t>
-            </a:r>
             <a:endParaRPr lang="ru-RU" sz="2000" dirty="0">
               <a:solidFill>
                 <a:schemeClr val="tx1"/>
@@ -5357,7 +5762,7 @@
                   <a:schemeClr val="tx1"/>
                 </a:solidFill>
               </a:rPr>
-              <a:t>В ходе исследований было выявлено</a:t>
+              <a:t>В </a:t>
             </a:r>
             <a:r>
               <a:rPr lang="ru-RU" sz="2000" dirty="0">
@@ -5365,40 +5770,27 @@
                   <a:schemeClr val="tx1"/>
                 </a:solidFill>
               </a:rPr>
-              <a:t>, что с увеличением площади ландшафта разница во времени обработки изображения ландшафта между наличием и отсутствием теней растёт с </a:t>
-            </a:r>
-            <a:r>
-              <a:rPr lang="ru-RU" sz="2000" dirty="0" smtClean="0">
-                <a:solidFill>
-                  <a:schemeClr val="tx1"/>
-                </a:solidFill>
-              </a:rPr>
-              <a:t>ускорением.</a:t>
-            </a:r>
-            <a:endParaRPr lang="ru-RU" sz="2000" dirty="0" smtClean="0">
-              <a:solidFill>
-                <a:schemeClr val="tx1"/>
-              </a:solidFill>
-            </a:endParaRPr>
-          </a:p>
-          <a:p>
-            <a:pPr lvl="1" algn="just">
-              <a:buFont typeface="Arial" panose="020B0604020202020204" pitchFamily="34" charset="0"/>
-              <a:buChar char="•"/>
+              <a:t>качестве развития проекта можно предложить:</a:t>
+            </a:r>
+          </a:p>
+          <a:p>
+            <a:pPr lvl="2" algn="just">
+              <a:buFont typeface="Courier New" panose="02070309020205020404" pitchFamily="49" charset="0"/>
+              <a:buChar char="o"/>
             </a:pPr>
             <a:r>
-              <a:rPr lang="ru-RU" sz="2000" dirty="0" smtClean="0">
-                <a:solidFill>
-                  <a:schemeClr val="tx1"/>
-                </a:solidFill>
-              </a:rPr>
-              <a:t>В качестве развития проекта можно предложить:</a:t>
+              <a:rPr lang="ru-RU" sz="1600" dirty="0">
+                <a:solidFill>
+                  <a:schemeClr val="tx1"/>
+                </a:solidFill>
+              </a:rPr>
+              <a:t>изучение технологий, реализующих необходимые алгоритмы на видеокартах;</a:t>
             </a:r>
           </a:p>
           <a:p>
             <a:pPr lvl="2" algn="just">
-              <a:buFont typeface="Arial" panose="020B0604020202020204" pitchFamily="34" charset="0"/>
-              <a:buChar char="•"/>
+              <a:buFont typeface="Courier New" panose="02070309020205020404" pitchFamily="49" charset="0"/>
+              <a:buChar char="o"/>
             </a:pPr>
             <a:r>
               <a:rPr lang="ru-RU" sz="1600" dirty="0">
@@ -5406,42 +5798,39 @@
                   <a:schemeClr val="tx1"/>
                 </a:solidFill>
               </a:rPr>
-              <a:t>изучение технологий, реализующих необходимые алгоритмы на </a:t>
-            </a:r>
-            <a:r>
-              <a:rPr lang="ru-RU" sz="1600" dirty="0" smtClean="0">
-                <a:solidFill>
-                  <a:schemeClr val="tx1"/>
-                </a:solidFill>
-              </a:rPr>
-              <a:t>видеокартах;</a:t>
-            </a:r>
-          </a:p>
-          <a:p>
-            <a:pPr lvl="2" algn="just">
-              <a:buFont typeface="Arial" panose="020B0604020202020204" pitchFamily="34" charset="0"/>
-              <a:buChar char="•"/>
-            </a:pPr>
-            <a:r>
-              <a:rPr lang="ru-RU" sz="1600" dirty="0">
-                <a:solidFill>
-                  <a:schemeClr val="tx1"/>
-                </a:solidFill>
-              </a:rPr>
-              <a:t>реализацию функций для добавления трёхмерных моделей на поверхность ландшафта или редактирования рельефа </a:t>
-            </a:r>
-            <a:r>
-              <a:rPr lang="ru-RU" sz="1600" dirty="0" smtClean="0">
-                <a:solidFill>
-                  <a:schemeClr val="tx1"/>
-                </a:solidFill>
-              </a:rPr>
-              <a:t>ландшафта.</a:t>
-            </a:r>
-            <a:endParaRPr lang="ru-RU" sz="1600" dirty="0" smtClean="0">
-              <a:solidFill>
-                <a:schemeClr val="tx1"/>
-              </a:solidFill>
+              <a:t>реализацию функций для добавления трёхмерных моделей на поверхность ландшафта или редактирования рельефа ландшафта.</a:t>
+            </a:r>
+          </a:p>
+          <a:p>
+            <a:endParaRPr lang="ru-RU" dirty="0"/>
+          </a:p>
+        </p:txBody>
+      </p:sp>
+      <p:sp>
+        <p:nvSpPr>
+          <p:cNvPr id="4" name="Номер слайда 3"/>
+          <p:cNvSpPr>
+            <a:spLocks noGrp="1"/>
+          </p:cNvSpPr>
+          <p:nvPr>
+            <p:ph type="sldNum" sz="quarter" idx="12"/>
+          </p:nvPr>
+        </p:nvSpPr>
+        <p:spPr/>
+        <p:txBody>
+          <a:bodyPr/>
+          <a:lstStyle/>
+          <a:p>
+            <a:fld id="{C4F09F00-B2EF-4E92-A50A-EB2934570B6C}" type="slidenum">
+              <a:rPr lang="ru-RU" sz="1800" smtClean="0">
+                <a:latin typeface="Times New Roman" panose="02020603050405020304" pitchFamily="18" charset="0"/>
+                <a:cs typeface="Times New Roman" panose="02020603050405020304" pitchFamily="18" charset="0"/>
+              </a:rPr>
+              <a:t>15</a:t>
+            </a:fld>
+            <a:endParaRPr lang="ru-RU" dirty="0">
+              <a:latin typeface="Times New Roman" panose="02020603050405020304" pitchFamily="18" charset="0"/>
+              <a:cs typeface="Times New Roman" panose="02020603050405020304" pitchFamily="18" charset="0"/>
             </a:endParaRPr>
           </a:p>
         </p:txBody>
@@ -5449,7 +5838,7 @@
     </p:spTree>
     <p:extLst>
       <p:ext uri="{BB962C8B-B14F-4D97-AF65-F5344CB8AC3E}">
-        <p14:creationId xmlns:p14="http://schemas.microsoft.com/office/powerpoint/2010/main" val="990386606"/>
+        <p14:creationId xmlns:p14="http://schemas.microsoft.com/office/powerpoint/2010/main" val="4021810059"/>
       </p:ext>
     </p:extLst>
   </p:cSld>
@@ -5563,11 +5952,6 @@
               </a:rPr>
               <a:t>.</a:t>
             </a:r>
-            <a:endParaRPr lang="ru-RU" dirty="0" smtClean="0">
-              <a:solidFill>
-                <a:schemeClr val="tx1"/>
-              </a:solidFill>
-            </a:endParaRPr>
           </a:p>
           <a:p>
             <a:pPr algn="just"/>
@@ -5617,11 +6001,6 @@
               </a:rPr>
               <a:t>;</a:t>
             </a:r>
-            <a:endParaRPr lang="ru-RU" dirty="0" smtClean="0">
-              <a:solidFill>
-                <a:schemeClr val="tx1"/>
-              </a:solidFill>
-            </a:endParaRPr>
           </a:p>
           <a:p>
             <a:pPr lvl="1" algn="just">
@@ -5682,11 +6061,6 @@
               </a:rPr>
               <a:t>алгоритмы;</a:t>
             </a:r>
-            <a:endParaRPr lang="ru-RU" dirty="0" smtClean="0">
-              <a:solidFill>
-                <a:schemeClr val="tx1"/>
-              </a:solidFill>
-            </a:endParaRPr>
           </a:p>
           <a:p>
             <a:pPr lvl="1" algn="just">
@@ -5709,10 +6083,34 @@
               </a:rPr>
               <a:t>программный продукт для визуализации и преобразования виртуальной сцены в дополненной реальности.</a:t>
             </a:r>
-            <a:endParaRPr lang="ru-RU" dirty="0">
-              <a:solidFill>
-                <a:schemeClr val="tx1"/>
-              </a:solidFill>
+          </a:p>
+        </p:txBody>
+      </p:sp>
+      <p:sp>
+        <p:nvSpPr>
+          <p:cNvPr id="4" name="Номер слайда 3"/>
+          <p:cNvSpPr>
+            <a:spLocks noGrp="1"/>
+          </p:cNvSpPr>
+          <p:nvPr>
+            <p:ph type="sldNum" sz="quarter" idx="12"/>
+          </p:nvPr>
+        </p:nvSpPr>
+        <p:spPr/>
+        <p:txBody>
+          <a:bodyPr/>
+          <a:lstStyle/>
+          <a:p>
+            <a:fld id="{C4F09F00-B2EF-4E92-A50A-EB2934570B6C}" type="slidenum">
+              <a:rPr lang="ru-RU" sz="1800" smtClean="0">
+                <a:latin typeface="Times New Roman" panose="02020603050405020304" pitchFamily="18" charset="0"/>
+                <a:cs typeface="Times New Roman" panose="02020603050405020304" pitchFamily="18" charset="0"/>
+              </a:rPr>
+              <a:t>2</a:t>
+            </a:fld>
+            <a:endParaRPr lang="ru-RU" sz="1800" dirty="0">
+              <a:latin typeface="Times New Roman" panose="02020603050405020304" pitchFamily="18" charset="0"/>
+              <a:cs typeface="Times New Roman" panose="02020603050405020304" pitchFamily="18" charset="0"/>
             </a:endParaRPr>
           </a:p>
         </p:txBody>
@@ -5768,7 +6166,7 @@
                   <a:schemeClr val="tx1"/>
                 </a:solidFill>
               </a:rPr>
-              <a:t>Введение в дополненную реальность</a:t>
+              <a:t>Дополненная реальность</a:t>
             </a:r>
             <a:endParaRPr lang="ru-RU" dirty="0">
               <a:solidFill>
@@ -5899,9 +6297,38 @@
           </a:p>
         </p:txBody>
       </p:sp>
+      <p:sp>
+        <p:nvSpPr>
+          <p:cNvPr id="4" name="Номер слайда 3"/>
+          <p:cNvSpPr>
+            <a:spLocks noGrp="1"/>
+          </p:cNvSpPr>
+          <p:nvPr>
+            <p:ph type="sldNum" sz="quarter" idx="12"/>
+          </p:nvPr>
+        </p:nvSpPr>
+        <p:spPr/>
+        <p:txBody>
+          <a:bodyPr/>
+          <a:lstStyle/>
+          <a:p>
+            <a:fld id="{C4F09F00-B2EF-4E92-A50A-EB2934570B6C}" type="slidenum">
+              <a:rPr lang="ru-RU" sz="1800" smtClean="0">
+                <a:latin typeface="Times New Roman" panose="02020603050405020304" pitchFamily="18" charset="0"/>
+                <a:cs typeface="Times New Roman" panose="02020603050405020304" pitchFamily="18" charset="0"/>
+              </a:rPr>
+              <a:t>3</a:t>
+            </a:fld>
+            <a:endParaRPr lang="ru-RU" sz="1800" dirty="0">
+              <a:latin typeface="Times New Roman" panose="02020603050405020304" pitchFamily="18" charset="0"/>
+              <a:cs typeface="Times New Roman" panose="02020603050405020304" pitchFamily="18" charset="0"/>
+            </a:endParaRPr>
+          </a:p>
+        </p:txBody>
+      </p:sp>
       <p:pic>
         <p:nvPicPr>
-          <p:cNvPr id="2050" name="Picture 2" descr="Дополненная реальность — Википедия"/>
+          <p:cNvPr id="1026" name="Picture 2" descr="Тренды дополненной реальности, которые будут определять маркетинг в 2019  году. Читайте на Cossa.ru"/>
           <p:cNvPicPr>
             <a:picLocks noChangeAspect="1" noChangeArrowheads="1"/>
           </p:cNvPicPr>
@@ -5915,13 +6342,133 @@
               </a:ext>
             </a:extLst>
           </a:blip>
-          <a:srcRect t="12668"/>
+          <a:srcRect l="27416" t="11966" r="28069" b="10131"/>
           <a:stretch/>
         </p:blipFill>
         <p:spPr bwMode="auto">
           <a:xfrm>
-            <a:off x="7081723" y="2712027"/>
-            <a:ext cx="4073957" cy="2578660"/>
+            <a:off x="5252707" y="4118918"/>
+            <a:ext cx="2021304" cy="1858549"/>
+          </a:xfrm>
+          <a:prstGeom prst="rect">
+            <a:avLst/>
+          </a:prstGeom>
+          <a:noFill/>
+          <a:extLst>
+            <a:ext uri="{909E8E84-426E-40DD-AFC4-6F175D3DCCD1}">
+              <a14:hiddenFill xmlns:a14="http://schemas.microsoft.com/office/drawing/2010/main">
+                <a:solidFill>
+                  <a:srgbClr val="FFFFFF"/>
+                </a:solidFill>
+              </a14:hiddenFill>
+            </a:ext>
+          </a:extLst>
+        </p:spPr>
+      </p:pic>
+      <p:sp>
+        <p:nvSpPr>
+          <p:cNvPr id="7" name="AutoShape 8" descr="https://games.mail.ru/hotbox/content_files/gallery/1a/4f/invizimals_screenshot_589d1ea8.jpeg"/>
+          <p:cNvSpPr>
+            <a:spLocks noChangeAspect="1" noChangeArrowheads="1"/>
+          </p:cNvSpPr>
+          <p:nvPr/>
+        </p:nvSpPr>
+        <p:spPr bwMode="auto">
+          <a:xfrm>
+            <a:off x="155575" y="-144463"/>
+            <a:ext cx="304800" cy="304801"/>
+          </a:xfrm>
+          <a:prstGeom prst="rect">
+            <a:avLst/>
+          </a:prstGeom>
+          <a:noFill/>
+          <a:extLst>
+            <a:ext uri="{909E8E84-426E-40DD-AFC4-6F175D3DCCD1}">
+              <a14:hiddenFill xmlns:a14="http://schemas.microsoft.com/office/drawing/2010/main">
+                <a:solidFill>
+                  <a:srgbClr val="FFFFFF"/>
+                </a:solidFill>
+              </a14:hiddenFill>
+            </a:ext>
+          </a:extLst>
+        </p:spPr>
+        <p:txBody>
+          <a:bodyPr vert="horz" wrap="square" lIns="91440" tIns="45720" rIns="91440" bIns="45720" numCol="1" anchor="t" anchorCtr="0" compatLnSpc="1">
+            <a:prstTxWarp prst="textNoShape">
+              <a:avLst/>
+            </a:prstTxWarp>
+          </a:bodyPr>
+          <a:lstStyle/>
+          <a:p>
+            <a:endParaRPr lang="ru-RU"/>
+          </a:p>
+        </p:txBody>
+      </p:sp>
+      <p:pic>
+        <p:nvPicPr>
+          <p:cNvPr id="9" name="Рисунок 8"/>
+          <p:cNvPicPr>
+            <a:picLocks noChangeAspect="1"/>
+          </p:cNvPicPr>
+          <p:nvPr/>
+        </p:nvPicPr>
+        <p:blipFill>
+          <a:blip r:embed="rId3">
+            <a:extLst>
+              <a:ext uri="{28A0092B-C50C-407E-A947-70E740481C1C}">
+                <a14:useLocalDpi xmlns:a14="http://schemas.microsoft.com/office/drawing/2010/main" val="0"/>
+              </a:ext>
+            </a:extLst>
+          </a:blip>
+          <a:stretch>
+            <a:fillRect/>
+          </a:stretch>
+        </p:blipFill>
+        <p:spPr>
+          <a:xfrm>
+            <a:off x="1338654" y="4173104"/>
+            <a:ext cx="3088546" cy="1750176"/>
+          </a:xfrm>
+          <a:prstGeom prst="rect">
+            <a:avLst/>
+          </a:prstGeom>
+          <a:ln w="88900" cap="sq" cmpd="thickThin">
+            <a:solidFill>
+              <a:srgbClr val="000000"/>
+            </a:solidFill>
+            <a:prstDash val="solid"/>
+            <a:miter lim="800000"/>
+          </a:ln>
+          <a:effectLst>
+            <a:innerShdw blurRad="76200">
+              <a:srgbClr val="000000"/>
+            </a:innerShdw>
+          </a:effectLst>
+        </p:spPr>
+      </p:pic>
+      <p:pic>
+        <p:nvPicPr>
+          <p:cNvPr id="1038" name="Picture 14" descr="Pokemon Go нашла первого коммерческого партнера - Ведомости"/>
+          <p:cNvPicPr>
+            <a:picLocks noChangeAspect="1" noChangeArrowheads="1"/>
+          </p:cNvPicPr>
+          <p:nvPr/>
+        </p:nvPicPr>
+        <p:blipFill rotWithShape="1">
+          <a:blip r:embed="rId4" cstate="print">
+            <a:extLst>
+              <a:ext uri="{28A0092B-C50C-407E-A947-70E740481C1C}">
+                <a14:useLocalDpi xmlns:a14="http://schemas.microsoft.com/office/drawing/2010/main" val="0"/>
+              </a:ext>
+            </a:extLst>
+          </a:blip>
+          <a:srcRect l="17685" r="18112"/>
+          <a:stretch/>
+        </p:blipFill>
+        <p:spPr bwMode="auto">
+          <a:xfrm>
+            <a:off x="8156283" y="4118918"/>
+            <a:ext cx="2117124" cy="1856007"/>
           </a:xfrm>
           <a:prstGeom prst="rect">
             <a:avLst/>
@@ -6060,12 +6607,20 @@
           <a:p>
             <a:pPr lvl="1"/>
             <a:r>
+              <a:rPr lang="ru-RU" smtClean="0">
+                <a:solidFill>
+                  <a:schemeClr val="tx1"/>
+                </a:solidFill>
+              </a:rPr>
+              <a:t>Алгоритм удаления </a:t>
+            </a:r>
+            <a:r>
               <a:rPr lang="ru-RU" dirty="0" smtClean="0">
                 <a:solidFill>
                   <a:schemeClr val="tx1"/>
                 </a:solidFill>
               </a:rPr>
-              <a:t>Удаление невидимых линий и поверхностей: алгоритм с </a:t>
+              <a:t>невидимых линий и поверхностей: алгоритм с </a:t>
             </a:r>
             <a:r>
               <a:rPr lang="en-US" dirty="0" smtClean="0">
@@ -6155,6 +6710,35 @@
               <a:solidFill>
                 <a:schemeClr val="tx1"/>
               </a:solidFill>
+            </a:endParaRPr>
+          </a:p>
+        </p:txBody>
+      </p:sp>
+      <p:sp>
+        <p:nvSpPr>
+          <p:cNvPr id="4" name="Номер слайда 3"/>
+          <p:cNvSpPr>
+            <a:spLocks noGrp="1"/>
+          </p:cNvSpPr>
+          <p:nvPr>
+            <p:ph type="sldNum" sz="quarter" idx="12"/>
+          </p:nvPr>
+        </p:nvSpPr>
+        <p:spPr/>
+        <p:txBody>
+          <a:bodyPr/>
+          <a:lstStyle/>
+          <a:p>
+            <a:fld id="{C4F09F00-B2EF-4E92-A50A-EB2934570B6C}" type="slidenum">
+              <a:rPr lang="ru-RU" sz="1800" smtClean="0">
+                <a:latin typeface="Times New Roman" panose="02020603050405020304" pitchFamily="18" charset="0"/>
+                <a:cs typeface="Times New Roman" panose="02020603050405020304" pitchFamily="18" charset="0"/>
+              </a:rPr>
+              <a:t>4</a:t>
+            </a:fld>
+            <a:endParaRPr lang="ru-RU" sz="1800" dirty="0">
+              <a:latin typeface="Times New Roman" panose="02020603050405020304" pitchFamily="18" charset="0"/>
+              <a:cs typeface="Times New Roman" panose="02020603050405020304" pitchFamily="18" charset="0"/>
             </a:endParaRPr>
           </a:p>
         </p:txBody>
@@ -6492,6 +7076,35 @@
           </a:prstGeom>
         </p:spPr>
       </p:pic>
+      <p:sp>
+        <p:nvSpPr>
+          <p:cNvPr id="5" name="Номер слайда 4"/>
+          <p:cNvSpPr>
+            <a:spLocks noGrp="1"/>
+          </p:cNvSpPr>
+          <p:nvPr>
+            <p:ph type="sldNum" sz="quarter" idx="12"/>
+          </p:nvPr>
+        </p:nvSpPr>
+        <p:spPr/>
+        <p:txBody>
+          <a:bodyPr/>
+          <a:lstStyle/>
+          <a:p>
+            <a:fld id="{C4F09F00-B2EF-4E92-A50A-EB2934570B6C}" type="slidenum">
+              <a:rPr lang="ru-RU" sz="1800" smtClean="0">
+                <a:latin typeface="Times New Roman" panose="02020603050405020304" pitchFamily="18" charset="0"/>
+                <a:cs typeface="Times New Roman" panose="02020603050405020304" pitchFamily="18" charset="0"/>
+              </a:rPr>
+              <a:t>5</a:t>
+            </a:fld>
+            <a:endParaRPr lang="ru-RU" sz="1800" dirty="0">
+              <a:latin typeface="Times New Roman" panose="02020603050405020304" pitchFamily="18" charset="0"/>
+              <a:cs typeface="Times New Roman" panose="02020603050405020304" pitchFamily="18" charset="0"/>
+            </a:endParaRPr>
+          </a:p>
+        </p:txBody>
+      </p:sp>
     </p:spTree>
     <p:extLst>
       <p:ext uri="{BB962C8B-B14F-4D97-AF65-F5344CB8AC3E}">
@@ -6553,8 +7166,8 @@
           </a:p>
         </p:txBody>
       </p:sp>
-      <mc:AlternateContent xmlns:mc="http://schemas.openxmlformats.org/markup-compatibility/2006">
-        <mc:Choice xmlns:a14="http://schemas.microsoft.com/office/drawing/2010/main" Requires="a14">
+      <mc:AlternateContent xmlns:mc="http://schemas.openxmlformats.org/markup-compatibility/2006" xmlns:a14="http://schemas.microsoft.com/office/drawing/2010/main">
+        <mc:Choice Requires="a14">
           <p:sp>
             <p:nvSpPr>
               <p:cNvPr id="3" name="Объект 2"/>
@@ -6590,6 +7203,7 @@
                             <a:solidFill>
                               <a:schemeClr val="tx1"/>
                             </a:solidFill>
+                            <a:latin typeface="Cambria Math" panose="02040503050406030204" pitchFamily="18" charset="0"/>
                           </a:rPr>
                         </m:ctrlPr>
                       </m:sSubPr>
@@ -6599,6 +7213,7 @@
                             <a:solidFill>
                               <a:schemeClr val="tx1"/>
                             </a:solidFill>
+                            <a:latin typeface="Cambria Math" panose="02040503050406030204" pitchFamily="18" charset="0"/>
                           </a:rPr>
                           <m:t>𝑢</m:t>
                         </m:r>
@@ -6609,6 +7224,7 @@
                             <a:solidFill>
                               <a:schemeClr val="tx1"/>
                             </a:solidFill>
+                            <a:latin typeface="Cambria Math" panose="02040503050406030204" pitchFamily="18" charset="0"/>
                           </a:rPr>
                           <m:t>𝛼</m:t>
                         </m:r>
@@ -6619,6 +7235,7 @@
                         <a:solidFill>
                           <a:schemeClr val="tx1"/>
                         </a:solidFill>
+                        <a:latin typeface="Cambria Math" panose="02040503050406030204" pitchFamily="18" charset="0"/>
                       </a:rPr>
                       <m:t>=</m:t>
                     </m:r>
@@ -6629,6 +7246,7 @@
                             <a:solidFill>
                               <a:schemeClr val="tx1"/>
                             </a:solidFill>
+                            <a:latin typeface="Cambria Math" panose="02040503050406030204" pitchFamily="18" charset="0"/>
                           </a:rPr>
                         </m:ctrlPr>
                       </m:fPr>
@@ -6640,6 +7258,7 @@
                                 <a:solidFill>
                                   <a:schemeClr val="tx1"/>
                                 </a:solidFill>
+                                <a:latin typeface="Cambria Math" panose="02040503050406030204" pitchFamily="18" charset="0"/>
                               </a:rPr>
                             </m:ctrlPr>
                           </m:dPr>
@@ -6649,6 +7268,7 @@
                                 <a:solidFill>
                                   <a:schemeClr val="tx1"/>
                                 </a:solidFill>
+                                <a:latin typeface="Cambria Math" panose="02040503050406030204" pitchFamily="18" charset="0"/>
                               </a:rPr>
                               <m:t>1− </m:t>
                             </m:r>
@@ -6657,6 +7277,7 @@
                                 <a:solidFill>
                                   <a:schemeClr val="tx1"/>
                                 </a:solidFill>
+                                <a:latin typeface="Cambria Math" panose="02040503050406030204" pitchFamily="18" charset="0"/>
                               </a:rPr>
                               <m:t>𝛼</m:t>
                             </m:r>
@@ -6669,6 +7290,7 @@
                                 <a:solidFill>
                                   <a:schemeClr val="tx1"/>
                                 </a:solidFill>
+                                <a:latin typeface="Cambria Math" panose="02040503050406030204" pitchFamily="18" charset="0"/>
                               </a:rPr>
                             </m:ctrlPr>
                           </m:fPr>
@@ -6680,6 +7302,7 @@
                                     <a:solidFill>
                                       <a:schemeClr val="tx1"/>
                                     </a:solidFill>
+                                    <a:latin typeface="Cambria Math" panose="02040503050406030204" pitchFamily="18" charset="0"/>
                                   </a:rPr>
                                 </m:ctrlPr>
                               </m:sSubPr>
@@ -6689,6 +7312,7 @@
                                     <a:solidFill>
                                       <a:schemeClr val="tx1"/>
                                     </a:solidFill>
+                                    <a:latin typeface="Cambria Math" panose="02040503050406030204" pitchFamily="18" charset="0"/>
                                   </a:rPr>
                                   <m:t>𝑢</m:t>
                                 </m:r>
@@ -6699,6 +7323,7 @@
                                     <a:solidFill>
                                       <a:schemeClr val="tx1"/>
                                     </a:solidFill>
+                                    <a:latin typeface="Cambria Math" panose="02040503050406030204" pitchFamily="18" charset="0"/>
                                   </a:rPr>
                                   <m:t>0</m:t>
                                 </m:r>
@@ -6713,6 +7338,7 @@
                                     <a:solidFill>
                                       <a:schemeClr val="tx1"/>
                                     </a:solidFill>
+                                    <a:latin typeface="Cambria Math" panose="02040503050406030204" pitchFamily="18" charset="0"/>
                                   </a:rPr>
                                 </m:ctrlPr>
                               </m:sSubPr>
@@ -6722,6 +7348,7 @@
                                     <a:solidFill>
                                       <a:schemeClr val="tx1"/>
                                     </a:solidFill>
+                                    <a:latin typeface="Cambria Math" panose="02040503050406030204" pitchFamily="18" charset="0"/>
                                   </a:rPr>
                                   <m:t>𝑧</m:t>
                                 </m:r>
@@ -6732,6 +7359,7 @@
                                     <a:solidFill>
                                       <a:schemeClr val="tx1"/>
                                     </a:solidFill>
+                                    <a:latin typeface="Cambria Math" panose="02040503050406030204" pitchFamily="18" charset="0"/>
                                   </a:rPr>
                                   <m:t>0</m:t>
                                 </m:r>
@@ -6744,6 +7372,7 @@
                             <a:solidFill>
                               <a:schemeClr val="tx1"/>
                             </a:solidFill>
+                            <a:latin typeface="Cambria Math" panose="02040503050406030204" pitchFamily="18" charset="0"/>
                           </a:rPr>
                           <m:t>+</m:t>
                         </m:r>
@@ -6752,6 +7381,7 @@
                             <a:solidFill>
                               <a:schemeClr val="tx1"/>
                             </a:solidFill>
+                            <a:latin typeface="Cambria Math" panose="02040503050406030204" pitchFamily="18" charset="0"/>
                           </a:rPr>
                           <m:t>𝛼</m:t>
                         </m:r>
@@ -6762,6 +7392,7 @@
                                 <a:solidFill>
                                   <a:schemeClr val="tx1"/>
                                 </a:solidFill>
+                                <a:latin typeface="Cambria Math" panose="02040503050406030204" pitchFamily="18" charset="0"/>
                               </a:rPr>
                             </m:ctrlPr>
                           </m:fPr>
@@ -6773,6 +7404,7 @@
                                     <a:solidFill>
                                       <a:schemeClr val="tx1"/>
                                     </a:solidFill>
+                                    <a:latin typeface="Cambria Math" panose="02040503050406030204" pitchFamily="18" charset="0"/>
                                   </a:rPr>
                                 </m:ctrlPr>
                               </m:sSubPr>
@@ -6782,6 +7414,7 @@
                                     <a:solidFill>
                                       <a:schemeClr val="tx1"/>
                                     </a:solidFill>
+                                    <a:latin typeface="Cambria Math" panose="02040503050406030204" pitchFamily="18" charset="0"/>
                                   </a:rPr>
                                   <m:t>𝑢</m:t>
                                 </m:r>
@@ -6792,6 +7425,7 @@
                                     <a:solidFill>
                                       <a:schemeClr val="tx1"/>
                                     </a:solidFill>
+                                    <a:latin typeface="Cambria Math" panose="02040503050406030204" pitchFamily="18" charset="0"/>
                                   </a:rPr>
                                   <m:t>1</m:t>
                                 </m:r>
@@ -6806,6 +7440,7 @@
                                     <a:solidFill>
                                       <a:schemeClr val="tx1"/>
                                     </a:solidFill>
+                                    <a:latin typeface="Cambria Math" panose="02040503050406030204" pitchFamily="18" charset="0"/>
                                   </a:rPr>
                                 </m:ctrlPr>
                               </m:sSubPr>
@@ -6815,6 +7450,7 @@
                                     <a:solidFill>
                                       <a:schemeClr val="tx1"/>
                                     </a:solidFill>
+                                    <a:latin typeface="Cambria Math" panose="02040503050406030204" pitchFamily="18" charset="0"/>
                                   </a:rPr>
                                   <m:t>𝑧</m:t>
                                 </m:r>
@@ -6825,6 +7461,7 @@
                                     <a:solidFill>
                                       <a:schemeClr val="tx1"/>
                                     </a:solidFill>
+                                    <a:latin typeface="Cambria Math" panose="02040503050406030204" pitchFamily="18" charset="0"/>
                                   </a:rPr>
                                   <m:t>1</m:t>
                                 </m:r>
@@ -6841,6 +7478,7 @@
                                 <a:solidFill>
                                   <a:schemeClr val="tx1"/>
                                 </a:solidFill>
+                                <a:latin typeface="Cambria Math" panose="02040503050406030204" pitchFamily="18" charset="0"/>
                               </a:rPr>
                             </m:ctrlPr>
                           </m:dPr>
@@ -6850,6 +7488,7 @@
                                 <a:solidFill>
                                   <a:schemeClr val="tx1"/>
                                 </a:solidFill>
+                                <a:latin typeface="Cambria Math" panose="02040503050406030204" pitchFamily="18" charset="0"/>
                               </a:rPr>
                               <m:t>1−</m:t>
                             </m:r>
@@ -6858,6 +7497,7 @@
                                 <a:solidFill>
                                   <a:schemeClr val="tx1"/>
                                 </a:solidFill>
+                                <a:latin typeface="Cambria Math" panose="02040503050406030204" pitchFamily="18" charset="0"/>
                               </a:rPr>
                               <m:t>𝛼</m:t>
                             </m:r>
@@ -6870,6 +7510,7 @@
                                 <a:solidFill>
                                   <a:schemeClr val="tx1"/>
                                 </a:solidFill>
+                                <a:latin typeface="Cambria Math" panose="02040503050406030204" pitchFamily="18" charset="0"/>
                               </a:rPr>
                             </m:ctrlPr>
                           </m:fPr>
@@ -6879,6 +7520,7 @@
                                 <a:solidFill>
                                   <a:schemeClr val="tx1"/>
                                 </a:solidFill>
+                                <a:latin typeface="Cambria Math" panose="02040503050406030204" pitchFamily="18" charset="0"/>
                               </a:rPr>
                               <m:t>1</m:t>
                             </m:r>
@@ -6891,6 +7533,7 @@
                                     <a:solidFill>
                                       <a:schemeClr val="tx1"/>
                                     </a:solidFill>
+                                    <a:latin typeface="Cambria Math" panose="02040503050406030204" pitchFamily="18" charset="0"/>
                                   </a:rPr>
                                 </m:ctrlPr>
                               </m:sSubPr>
@@ -6900,6 +7543,7 @@
                                     <a:solidFill>
                                       <a:schemeClr val="tx1"/>
                                     </a:solidFill>
+                                    <a:latin typeface="Cambria Math" panose="02040503050406030204" pitchFamily="18" charset="0"/>
                                   </a:rPr>
                                   <m:t>𝑧</m:t>
                                 </m:r>
@@ -6910,6 +7554,7 @@
                                     <a:solidFill>
                                       <a:schemeClr val="tx1"/>
                                     </a:solidFill>
+                                    <a:latin typeface="Cambria Math" panose="02040503050406030204" pitchFamily="18" charset="0"/>
                                   </a:rPr>
                                   <m:t>0</m:t>
                                 </m:r>
@@ -6922,6 +7567,7 @@
                             <a:solidFill>
                               <a:schemeClr val="tx1"/>
                             </a:solidFill>
+                            <a:latin typeface="Cambria Math" panose="02040503050406030204" pitchFamily="18" charset="0"/>
                           </a:rPr>
                           <m:t>+</m:t>
                         </m:r>
@@ -6930,6 +7576,7 @@
                             <a:solidFill>
                               <a:schemeClr val="tx1"/>
                             </a:solidFill>
+                            <a:latin typeface="Cambria Math" panose="02040503050406030204" pitchFamily="18" charset="0"/>
                           </a:rPr>
                           <m:t>𝛼</m:t>
                         </m:r>
@@ -6940,6 +7587,7 @@
                                 <a:solidFill>
                                   <a:schemeClr val="tx1"/>
                                 </a:solidFill>
+                                <a:latin typeface="Cambria Math" panose="02040503050406030204" pitchFamily="18" charset="0"/>
                               </a:rPr>
                             </m:ctrlPr>
                           </m:fPr>
@@ -6949,6 +7597,7 @@
                                 <a:solidFill>
                                   <a:schemeClr val="tx1"/>
                                 </a:solidFill>
+                                <a:latin typeface="Cambria Math" panose="02040503050406030204" pitchFamily="18" charset="0"/>
                               </a:rPr>
                               <m:t>1</m:t>
                             </m:r>
@@ -6961,6 +7610,7 @@
                                     <a:solidFill>
                                       <a:schemeClr val="tx1"/>
                                     </a:solidFill>
+                                    <a:latin typeface="Cambria Math" panose="02040503050406030204" pitchFamily="18" charset="0"/>
                                   </a:rPr>
                                 </m:ctrlPr>
                               </m:sSubPr>
@@ -6970,6 +7620,7 @@
                                     <a:solidFill>
                                       <a:schemeClr val="tx1"/>
                                     </a:solidFill>
+                                    <a:latin typeface="Cambria Math" panose="02040503050406030204" pitchFamily="18" charset="0"/>
                                   </a:rPr>
                                   <m:t>𝑧</m:t>
                                 </m:r>
@@ -6980,6 +7631,7 @@
                                     <a:solidFill>
                                       <a:schemeClr val="tx1"/>
                                     </a:solidFill>
+                                    <a:latin typeface="Cambria Math" panose="02040503050406030204" pitchFamily="18" charset="0"/>
                                   </a:rPr>
                                   <m:t>1</m:t>
                                 </m:r>
@@ -6994,6 +7646,7 @@
                         <a:solidFill>
                           <a:schemeClr val="tx1"/>
                         </a:solidFill>
+                        <a:latin typeface="Cambria Math" panose="02040503050406030204" pitchFamily="18" charset="0"/>
                       </a:rPr>
                       <m:t>, </m:t>
                     </m:r>
@@ -7002,6 +7655,7 @@
                         <a:solidFill>
                           <a:schemeClr val="tx1"/>
                         </a:solidFill>
+                        <a:latin typeface="Cambria Math" panose="02040503050406030204" pitchFamily="18" charset="0"/>
                       </a:rPr>
                       <m:t>𝛼</m:t>
                     </m:r>
@@ -7010,6 +7664,7 @@
                         <a:solidFill>
                           <a:schemeClr val="tx1"/>
                         </a:solidFill>
+                        <a:latin typeface="Cambria Math" panose="02040503050406030204" pitchFamily="18" charset="0"/>
                       </a:rPr>
                       <m:t>= </m:t>
                     </m:r>
@@ -7020,6 +7675,7 @@
                             <a:solidFill>
                               <a:schemeClr val="tx1"/>
                             </a:solidFill>
+                            <a:latin typeface="Cambria Math" panose="02040503050406030204" pitchFamily="18" charset="0"/>
                           </a:rPr>
                         </m:ctrlPr>
                       </m:fPr>
@@ -7029,6 +7685,7 @@
                             <a:solidFill>
                               <a:schemeClr val="tx1"/>
                             </a:solidFill>
+                            <a:latin typeface="Cambria Math" panose="02040503050406030204" pitchFamily="18" charset="0"/>
                           </a:rPr>
                           <m:t>𝑥</m:t>
                         </m:r>
@@ -7037,6 +7694,7 @@
                             <a:solidFill>
                               <a:schemeClr val="tx1"/>
                             </a:solidFill>
+                            <a:latin typeface="Cambria Math" panose="02040503050406030204" pitchFamily="18" charset="0"/>
                           </a:rPr>
                           <m:t>− </m:t>
                         </m:r>
@@ -7047,6 +7705,7 @@
                                 <a:solidFill>
                                   <a:schemeClr val="tx1"/>
                                 </a:solidFill>
+                                <a:latin typeface="Cambria Math" panose="02040503050406030204" pitchFamily="18" charset="0"/>
                               </a:rPr>
                             </m:ctrlPr>
                           </m:sSubPr>
@@ -7056,6 +7715,7 @@
                                 <a:solidFill>
                                   <a:schemeClr val="tx1"/>
                                 </a:solidFill>
+                                <a:latin typeface="Cambria Math" panose="02040503050406030204" pitchFamily="18" charset="0"/>
                               </a:rPr>
                               <m:t>𝑥</m:t>
                             </m:r>
@@ -7066,6 +7726,7 @@
                                 <a:solidFill>
                                   <a:schemeClr val="tx1"/>
                                 </a:solidFill>
+                                <a:latin typeface="Cambria Math" panose="02040503050406030204" pitchFamily="18" charset="0"/>
                               </a:rPr>
                               <m:t>0</m:t>
                             </m:r>
@@ -7080,6 +7741,7 @@
                                 <a:solidFill>
                                   <a:schemeClr val="tx1"/>
                                 </a:solidFill>
+                                <a:latin typeface="Cambria Math" panose="02040503050406030204" pitchFamily="18" charset="0"/>
                               </a:rPr>
                             </m:ctrlPr>
                           </m:sSubPr>
@@ -7089,6 +7751,7 @@
                                 <a:solidFill>
                                   <a:schemeClr val="tx1"/>
                                 </a:solidFill>
+                                <a:latin typeface="Cambria Math" panose="02040503050406030204" pitchFamily="18" charset="0"/>
                               </a:rPr>
                               <m:t>𝑥</m:t>
                             </m:r>
@@ -7099,6 +7762,7 @@
                                 <a:solidFill>
                                   <a:schemeClr val="tx1"/>
                                 </a:solidFill>
+                                <a:latin typeface="Cambria Math" panose="02040503050406030204" pitchFamily="18" charset="0"/>
                               </a:rPr>
                               <m:t>1</m:t>
                             </m:r>
@@ -7109,6 +7773,7 @@
                             <a:solidFill>
                               <a:schemeClr val="tx1"/>
                             </a:solidFill>
+                            <a:latin typeface="Cambria Math" panose="02040503050406030204" pitchFamily="18" charset="0"/>
                           </a:rPr>
                           <m:t>−</m:t>
                         </m:r>
@@ -7119,6 +7784,7 @@
                                 <a:solidFill>
                                   <a:schemeClr val="tx1"/>
                                 </a:solidFill>
+                                <a:latin typeface="Cambria Math" panose="02040503050406030204" pitchFamily="18" charset="0"/>
                               </a:rPr>
                             </m:ctrlPr>
                           </m:sSubPr>
@@ -7128,6 +7794,7 @@
                                 <a:solidFill>
                                   <a:schemeClr val="tx1"/>
                                 </a:solidFill>
+                                <a:latin typeface="Cambria Math" panose="02040503050406030204" pitchFamily="18" charset="0"/>
                               </a:rPr>
                               <m:t>𝑥</m:t>
                             </m:r>
@@ -7138,6 +7805,7 @@
                                 <a:solidFill>
                                   <a:schemeClr val="tx1"/>
                                 </a:solidFill>
+                                <a:latin typeface="Cambria Math" panose="02040503050406030204" pitchFamily="18" charset="0"/>
                               </a:rPr>
                               <m:t>0</m:t>
                             </m:r>
@@ -7150,6 +7818,7 @@
                         <a:solidFill>
                           <a:schemeClr val="tx1"/>
                         </a:solidFill>
+                        <a:latin typeface="Cambria Math" panose="02040503050406030204" pitchFamily="18" charset="0"/>
                       </a:rPr>
                       <m:t> </m:t>
                     </m:r>
@@ -7175,6 +7844,7 @@
                             <a:solidFill>
                               <a:schemeClr val="tx1"/>
                             </a:solidFill>
+                            <a:latin typeface="Cambria Math" panose="02040503050406030204" pitchFamily="18" charset="0"/>
                           </a:rPr>
                         </m:ctrlPr>
                       </m:sSubPr>
@@ -7184,6 +7854,7 @@
                             <a:solidFill>
                               <a:schemeClr val="tx1"/>
                             </a:solidFill>
+                            <a:latin typeface="Cambria Math" panose="02040503050406030204" pitchFamily="18" charset="0"/>
                           </a:rPr>
                           <m:t>𝑣</m:t>
                         </m:r>
@@ -7194,6 +7865,7 @@
                             <a:solidFill>
                               <a:schemeClr val="tx1"/>
                             </a:solidFill>
+                            <a:latin typeface="Cambria Math" panose="02040503050406030204" pitchFamily="18" charset="0"/>
                           </a:rPr>
                           <m:t>𝛼</m:t>
                         </m:r>
@@ -7204,6 +7876,7 @@
                         <a:solidFill>
                           <a:schemeClr val="tx1"/>
                         </a:solidFill>
+                        <a:latin typeface="Cambria Math" panose="02040503050406030204" pitchFamily="18" charset="0"/>
                       </a:rPr>
                       <m:t>=</m:t>
                     </m:r>
@@ -7214,6 +7887,7 @@
                             <a:solidFill>
                               <a:schemeClr val="tx1"/>
                             </a:solidFill>
+                            <a:latin typeface="Cambria Math" panose="02040503050406030204" pitchFamily="18" charset="0"/>
                           </a:rPr>
                         </m:ctrlPr>
                       </m:fPr>
@@ -7225,6 +7899,7 @@
                                 <a:solidFill>
                                   <a:schemeClr val="tx1"/>
                                 </a:solidFill>
+                                <a:latin typeface="Cambria Math" panose="02040503050406030204" pitchFamily="18" charset="0"/>
                               </a:rPr>
                             </m:ctrlPr>
                           </m:dPr>
@@ -7234,6 +7909,7 @@
                                 <a:solidFill>
                                   <a:schemeClr val="tx1"/>
                                 </a:solidFill>
+                                <a:latin typeface="Cambria Math" panose="02040503050406030204" pitchFamily="18" charset="0"/>
                               </a:rPr>
                               <m:t>1− </m:t>
                             </m:r>
@@ -7242,6 +7918,7 @@
                                 <a:solidFill>
                                   <a:schemeClr val="tx1"/>
                                 </a:solidFill>
+                                <a:latin typeface="Cambria Math" panose="02040503050406030204" pitchFamily="18" charset="0"/>
                               </a:rPr>
                               <m:t>𝛼</m:t>
                             </m:r>
@@ -7254,6 +7931,7 @@
                                 <a:solidFill>
                                   <a:schemeClr val="tx1"/>
                                 </a:solidFill>
+                                <a:latin typeface="Cambria Math" panose="02040503050406030204" pitchFamily="18" charset="0"/>
                               </a:rPr>
                             </m:ctrlPr>
                           </m:fPr>
@@ -7265,6 +7943,7 @@
                                     <a:solidFill>
                                       <a:schemeClr val="tx1"/>
                                     </a:solidFill>
+                                    <a:latin typeface="Cambria Math" panose="02040503050406030204" pitchFamily="18" charset="0"/>
                                   </a:rPr>
                                 </m:ctrlPr>
                               </m:sSubPr>
@@ -7274,6 +7953,7 @@
                                     <a:solidFill>
                                       <a:schemeClr val="tx1"/>
                                     </a:solidFill>
+                                    <a:latin typeface="Cambria Math" panose="02040503050406030204" pitchFamily="18" charset="0"/>
                                   </a:rPr>
                                   <m:t>𝑣</m:t>
                                 </m:r>
@@ -7284,6 +7964,7 @@
                                     <a:solidFill>
                                       <a:schemeClr val="tx1"/>
                                     </a:solidFill>
+                                    <a:latin typeface="Cambria Math" panose="02040503050406030204" pitchFamily="18" charset="0"/>
                                   </a:rPr>
                                   <m:t>0</m:t>
                                 </m:r>
@@ -7298,6 +7979,7 @@
                                     <a:solidFill>
                                       <a:schemeClr val="tx1"/>
                                     </a:solidFill>
+                                    <a:latin typeface="Cambria Math" panose="02040503050406030204" pitchFamily="18" charset="0"/>
                                   </a:rPr>
                                 </m:ctrlPr>
                               </m:sSubPr>
@@ -7307,6 +7989,7 @@
                                     <a:solidFill>
                                       <a:schemeClr val="tx1"/>
                                     </a:solidFill>
+                                    <a:latin typeface="Cambria Math" panose="02040503050406030204" pitchFamily="18" charset="0"/>
                                   </a:rPr>
                                   <m:t>𝑧</m:t>
                                 </m:r>
@@ -7317,6 +8000,7 @@
                                     <a:solidFill>
                                       <a:schemeClr val="tx1"/>
                                     </a:solidFill>
+                                    <a:latin typeface="Cambria Math" panose="02040503050406030204" pitchFamily="18" charset="0"/>
                                   </a:rPr>
                                   <m:t>0</m:t>
                                 </m:r>
@@ -7329,6 +8013,7 @@
                             <a:solidFill>
                               <a:schemeClr val="tx1"/>
                             </a:solidFill>
+                            <a:latin typeface="Cambria Math" panose="02040503050406030204" pitchFamily="18" charset="0"/>
                           </a:rPr>
                           <m:t>+</m:t>
                         </m:r>
@@ -7337,6 +8022,7 @@
                             <a:solidFill>
                               <a:schemeClr val="tx1"/>
                             </a:solidFill>
+                            <a:latin typeface="Cambria Math" panose="02040503050406030204" pitchFamily="18" charset="0"/>
                           </a:rPr>
                           <m:t>𝛼</m:t>
                         </m:r>
@@ -7347,6 +8033,7 @@
                                 <a:solidFill>
                                   <a:schemeClr val="tx1"/>
                                 </a:solidFill>
+                                <a:latin typeface="Cambria Math" panose="02040503050406030204" pitchFamily="18" charset="0"/>
                               </a:rPr>
                             </m:ctrlPr>
                           </m:fPr>
@@ -7358,6 +8045,7 @@
                                     <a:solidFill>
                                       <a:schemeClr val="tx1"/>
                                     </a:solidFill>
+                                    <a:latin typeface="Cambria Math" panose="02040503050406030204" pitchFamily="18" charset="0"/>
                                   </a:rPr>
                                 </m:ctrlPr>
                               </m:sSubPr>
@@ -7367,6 +8055,7 @@
                                     <a:solidFill>
                                       <a:schemeClr val="tx1"/>
                                     </a:solidFill>
+                                    <a:latin typeface="Cambria Math" panose="02040503050406030204" pitchFamily="18" charset="0"/>
                                   </a:rPr>
                                   <m:t>𝑣</m:t>
                                 </m:r>
@@ -7377,6 +8066,7 @@
                                     <a:solidFill>
                                       <a:schemeClr val="tx1"/>
                                     </a:solidFill>
+                                    <a:latin typeface="Cambria Math" panose="02040503050406030204" pitchFamily="18" charset="0"/>
                                   </a:rPr>
                                   <m:t>1</m:t>
                                 </m:r>
@@ -7391,6 +8081,7 @@
                                     <a:solidFill>
                                       <a:schemeClr val="tx1"/>
                                     </a:solidFill>
+                                    <a:latin typeface="Cambria Math" panose="02040503050406030204" pitchFamily="18" charset="0"/>
                                   </a:rPr>
                                 </m:ctrlPr>
                               </m:sSubPr>
@@ -7400,6 +8091,7 @@
                                     <a:solidFill>
                                       <a:schemeClr val="tx1"/>
                                     </a:solidFill>
+                                    <a:latin typeface="Cambria Math" panose="02040503050406030204" pitchFamily="18" charset="0"/>
                                   </a:rPr>
                                   <m:t>𝑧</m:t>
                                 </m:r>
@@ -7410,6 +8102,7 @@
                                     <a:solidFill>
                                       <a:schemeClr val="tx1"/>
                                     </a:solidFill>
+                                    <a:latin typeface="Cambria Math" panose="02040503050406030204" pitchFamily="18" charset="0"/>
                                   </a:rPr>
                                   <m:t>1</m:t>
                                 </m:r>
@@ -7426,6 +8119,7 @@
                                 <a:solidFill>
                                   <a:schemeClr val="tx1"/>
                                 </a:solidFill>
+                                <a:latin typeface="Cambria Math" panose="02040503050406030204" pitchFamily="18" charset="0"/>
                               </a:rPr>
                             </m:ctrlPr>
                           </m:dPr>
@@ -7435,6 +8129,7 @@
                                 <a:solidFill>
                                   <a:schemeClr val="tx1"/>
                                 </a:solidFill>
+                                <a:latin typeface="Cambria Math" panose="02040503050406030204" pitchFamily="18" charset="0"/>
                               </a:rPr>
                               <m:t>1−</m:t>
                             </m:r>
@@ -7443,6 +8138,7 @@
                                 <a:solidFill>
                                   <a:schemeClr val="tx1"/>
                                 </a:solidFill>
+                                <a:latin typeface="Cambria Math" panose="02040503050406030204" pitchFamily="18" charset="0"/>
                               </a:rPr>
                               <m:t>𝛼</m:t>
                             </m:r>
@@ -7455,6 +8151,7 @@
                                 <a:solidFill>
                                   <a:schemeClr val="tx1"/>
                                 </a:solidFill>
+                                <a:latin typeface="Cambria Math" panose="02040503050406030204" pitchFamily="18" charset="0"/>
                               </a:rPr>
                             </m:ctrlPr>
                           </m:fPr>
@@ -7464,6 +8161,7 @@
                                 <a:solidFill>
                                   <a:schemeClr val="tx1"/>
                                 </a:solidFill>
+                                <a:latin typeface="Cambria Math" panose="02040503050406030204" pitchFamily="18" charset="0"/>
                               </a:rPr>
                               <m:t>1</m:t>
                             </m:r>
@@ -7476,6 +8174,7 @@
                                     <a:solidFill>
                                       <a:schemeClr val="tx1"/>
                                     </a:solidFill>
+                                    <a:latin typeface="Cambria Math" panose="02040503050406030204" pitchFamily="18" charset="0"/>
                                   </a:rPr>
                                 </m:ctrlPr>
                               </m:sSubPr>
@@ -7485,6 +8184,7 @@
                                     <a:solidFill>
                                       <a:schemeClr val="tx1"/>
                                     </a:solidFill>
+                                    <a:latin typeface="Cambria Math" panose="02040503050406030204" pitchFamily="18" charset="0"/>
                                   </a:rPr>
                                   <m:t>𝑧</m:t>
                                 </m:r>
@@ -7495,6 +8195,7 @@
                                     <a:solidFill>
                                       <a:schemeClr val="tx1"/>
                                     </a:solidFill>
+                                    <a:latin typeface="Cambria Math" panose="02040503050406030204" pitchFamily="18" charset="0"/>
                                   </a:rPr>
                                   <m:t>0</m:t>
                                 </m:r>
@@ -7507,6 +8208,7 @@
                             <a:solidFill>
                               <a:schemeClr val="tx1"/>
                             </a:solidFill>
+                            <a:latin typeface="Cambria Math" panose="02040503050406030204" pitchFamily="18" charset="0"/>
                           </a:rPr>
                           <m:t>+</m:t>
                         </m:r>
@@ -7515,6 +8217,7 @@
                             <a:solidFill>
                               <a:schemeClr val="tx1"/>
                             </a:solidFill>
+                            <a:latin typeface="Cambria Math" panose="02040503050406030204" pitchFamily="18" charset="0"/>
                           </a:rPr>
                           <m:t>𝛼</m:t>
                         </m:r>
@@ -7525,6 +8228,7 @@
                                 <a:solidFill>
                                   <a:schemeClr val="tx1"/>
                                 </a:solidFill>
+                                <a:latin typeface="Cambria Math" panose="02040503050406030204" pitchFamily="18" charset="0"/>
                               </a:rPr>
                             </m:ctrlPr>
                           </m:fPr>
@@ -7534,6 +8238,7 @@
                                 <a:solidFill>
                                   <a:schemeClr val="tx1"/>
                                 </a:solidFill>
+                                <a:latin typeface="Cambria Math" panose="02040503050406030204" pitchFamily="18" charset="0"/>
                               </a:rPr>
                               <m:t>1</m:t>
                             </m:r>
@@ -7546,6 +8251,7 @@
                                     <a:solidFill>
                                       <a:schemeClr val="tx1"/>
                                     </a:solidFill>
+                                    <a:latin typeface="Cambria Math" panose="02040503050406030204" pitchFamily="18" charset="0"/>
                                   </a:rPr>
                                 </m:ctrlPr>
                               </m:sSubPr>
@@ -7555,6 +8261,7 @@
                                     <a:solidFill>
                                       <a:schemeClr val="tx1"/>
                                     </a:solidFill>
+                                    <a:latin typeface="Cambria Math" panose="02040503050406030204" pitchFamily="18" charset="0"/>
                                   </a:rPr>
                                   <m:t>𝑧</m:t>
                                 </m:r>
@@ -7565,6 +8272,7 @@
                                     <a:solidFill>
                                       <a:schemeClr val="tx1"/>
                                     </a:solidFill>
+                                    <a:latin typeface="Cambria Math" panose="02040503050406030204" pitchFamily="18" charset="0"/>
                                   </a:rPr>
                                   <m:t>1</m:t>
                                 </m:r>
@@ -7579,6 +8287,7 @@
                         <a:solidFill>
                           <a:schemeClr val="tx1"/>
                         </a:solidFill>
+                        <a:latin typeface="Cambria Math" panose="02040503050406030204" pitchFamily="18" charset="0"/>
                       </a:rPr>
                       <m:t>, </m:t>
                     </m:r>
@@ -7587,6 +8296,7 @@
                         <a:solidFill>
                           <a:schemeClr val="tx1"/>
                         </a:solidFill>
+                        <a:latin typeface="Cambria Math" panose="02040503050406030204" pitchFamily="18" charset="0"/>
                       </a:rPr>
                       <m:t>𝛼</m:t>
                     </m:r>
@@ -7595,6 +8305,7 @@
                         <a:solidFill>
                           <a:schemeClr val="tx1"/>
                         </a:solidFill>
+                        <a:latin typeface="Cambria Math" panose="02040503050406030204" pitchFamily="18" charset="0"/>
                       </a:rPr>
                       <m:t>= </m:t>
                     </m:r>
@@ -7605,6 +8316,7 @@
                             <a:solidFill>
                               <a:schemeClr val="tx1"/>
                             </a:solidFill>
+                            <a:latin typeface="Cambria Math" panose="02040503050406030204" pitchFamily="18" charset="0"/>
                           </a:rPr>
                         </m:ctrlPr>
                       </m:fPr>
@@ -7614,6 +8326,7 @@
                             <a:solidFill>
                               <a:schemeClr val="tx1"/>
                             </a:solidFill>
+                            <a:latin typeface="Cambria Math" panose="02040503050406030204" pitchFamily="18" charset="0"/>
                           </a:rPr>
                           <m:t>𝑦</m:t>
                         </m:r>
@@ -7622,6 +8335,7 @@
                             <a:solidFill>
                               <a:schemeClr val="tx1"/>
                             </a:solidFill>
+                            <a:latin typeface="Cambria Math" panose="02040503050406030204" pitchFamily="18" charset="0"/>
                           </a:rPr>
                           <m:t>− </m:t>
                         </m:r>
@@ -7632,6 +8346,7 @@
                                 <a:solidFill>
                                   <a:schemeClr val="tx1"/>
                                 </a:solidFill>
+                                <a:latin typeface="Cambria Math" panose="02040503050406030204" pitchFamily="18" charset="0"/>
                               </a:rPr>
                             </m:ctrlPr>
                           </m:sSubPr>
@@ -7641,6 +8356,7 @@
                                 <a:solidFill>
                                   <a:schemeClr val="tx1"/>
                                 </a:solidFill>
+                                <a:latin typeface="Cambria Math" panose="02040503050406030204" pitchFamily="18" charset="0"/>
                               </a:rPr>
                               <m:t>𝑦</m:t>
                             </m:r>
@@ -7651,6 +8367,7 @@
                                 <a:solidFill>
                                   <a:schemeClr val="tx1"/>
                                 </a:solidFill>
+                                <a:latin typeface="Cambria Math" panose="02040503050406030204" pitchFamily="18" charset="0"/>
                               </a:rPr>
                               <m:t>0</m:t>
                             </m:r>
@@ -7665,6 +8382,7 @@
                                 <a:solidFill>
                                   <a:schemeClr val="tx1"/>
                                 </a:solidFill>
+                                <a:latin typeface="Cambria Math" panose="02040503050406030204" pitchFamily="18" charset="0"/>
                               </a:rPr>
                             </m:ctrlPr>
                           </m:sSubPr>
@@ -7674,6 +8392,7 @@
                                 <a:solidFill>
                                   <a:schemeClr val="tx1"/>
                                 </a:solidFill>
+                                <a:latin typeface="Cambria Math" panose="02040503050406030204" pitchFamily="18" charset="0"/>
                               </a:rPr>
                               <m:t>𝑦</m:t>
                             </m:r>
@@ -7684,6 +8403,7 @@
                                 <a:solidFill>
                                   <a:schemeClr val="tx1"/>
                                 </a:solidFill>
+                                <a:latin typeface="Cambria Math" panose="02040503050406030204" pitchFamily="18" charset="0"/>
                               </a:rPr>
                               <m:t>1</m:t>
                             </m:r>
@@ -7694,6 +8414,7 @@
                             <a:solidFill>
                               <a:schemeClr val="tx1"/>
                             </a:solidFill>
+                            <a:latin typeface="Cambria Math" panose="02040503050406030204" pitchFamily="18" charset="0"/>
                           </a:rPr>
                           <m:t>−</m:t>
                         </m:r>
@@ -7704,6 +8425,7 @@
                                 <a:solidFill>
                                   <a:schemeClr val="tx1"/>
                                 </a:solidFill>
+                                <a:latin typeface="Cambria Math" panose="02040503050406030204" pitchFamily="18" charset="0"/>
                               </a:rPr>
                             </m:ctrlPr>
                           </m:sSubPr>
@@ -7713,6 +8435,7 @@
                                 <a:solidFill>
                                   <a:schemeClr val="tx1"/>
                                 </a:solidFill>
+                                <a:latin typeface="Cambria Math" panose="02040503050406030204" pitchFamily="18" charset="0"/>
                               </a:rPr>
                               <m:t>𝑦</m:t>
                             </m:r>
@@ -7723,6 +8446,7 @@
                                 <a:solidFill>
                                   <a:schemeClr val="tx1"/>
                                 </a:solidFill>
+                                <a:latin typeface="Cambria Math" panose="02040503050406030204" pitchFamily="18" charset="0"/>
                               </a:rPr>
                               <m:t>0</m:t>
                             </m:r>
@@ -7752,6 +8476,7 @@
                             <a:solidFill>
                               <a:schemeClr val="tx1"/>
                             </a:solidFill>
+                            <a:latin typeface="Cambria Math" panose="02040503050406030204" pitchFamily="18" charset="0"/>
                           </a:rPr>
                         </m:ctrlPr>
                       </m:sSubPr>
@@ -7761,6 +8486,7 @@
                             <a:solidFill>
                               <a:schemeClr val="tx1"/>
                             </a:solidFill>
+                            <a:latin typeface="Cambria Math" panose="02040503050406030204" pitchFamily="18" charset="0"/>
                           </a:rPr>
                           <m:t>𝑥</m:t>
                         </m:r>
@@ -7771,6 +8497,7 @@
                             <a:solidFill>
                               <a:schemeClr val="tx1"/>
                             </a:solidFill>
+                            <a:latin typeface="Cambria Math" panose="02040503050406030204" pitchFamily="18" charset="0"/>
                           </a:rPr>
                           <m:t>𝑝𝑖𝑥𝑒𝑙</m:t>
                         </m:r>
@@ -7781,6 +8508,7 @@
                         <a:solidFill>
                           <a:schemeClr val="tx1"/>
                         </a:solidFill>
+                        <a:latin typeface="Cambria Math" panose="02040503050406030204" pitchFamily="18" charset="0"/>
                       </a:rPr>
                       <m:t>=</m:t>
                     </m:r>
@@ -7791,6 +8519,7 @@
                             <a:solidFill>
                               <a:schemeClr val="tx1"/>
                             </a:solidFill>
+                            <a:latin typeface="Cambria Math" panose="02040503050406030204" pitchFamily="18" charset="0"/>
                           </a:rPr>
                         </m:ctrlPr>
                       </m:sSubPr>
@@ -7800,6 +8529,7 @@
                             <a:solidFill>
                               <a:schemeClr val="tx1"/>
                             </a:solidFill>
+                            <a:latin typeface="Cambria Math" panose="02040503050406030204" pitchFamily="18" charset="0"/>
                           </a:rPr>
                           <m:t>𝑓𝑙𝑜𝑜𝑟</m:t>
                         </m:r>
@@ -7808,6 +8538,7 @@
                             <a:solidFill>
                               <a:schemeClr val="tx1"/>
                             </a:solidFill>
+                            <a:latin typeface="Cambria Math" panose="02040503050406030204" pitchFamily="18" charset="0"/>
                           </a:rPr>
                           <m:t>((</m:t>
                         </m:r>
@@ -7816,6 +8547,7 @@
                             <a:solidFill>
                               <a:schemeClr val="tx1"/>
                             </a:solidFill>
+                            <a:latin typeface="Cambria Math" panose="02040503050406030204" pitchFamily="18" charset="0"/>
                           </a:rPr>
                           <m:t>𝑀</m:t>
                         </m:r>
@@ -7826,6 +8558,7 @@
                             <a:solidFill>
                               <a:schemeClr val="tx1"/>
                             </a:solidFill>
+                            <a:latin typeface="Cambria Math" panose="02040503050406030204" pitchFamily="18" charset="0"/>
                           </a:rPr>
                           <m:t>𝑥</m:t>
                         </m:r>
@@ -7836,6 +8569,7 @@
                         <a:solidFill>
                           <a:schemeClr val="tx1"/>
                         </a:solidFill>
+                        <a:latin typeface="Cambria Math" panose="02040503050406030204" pitchFamily="18" charset="0"/>
                       </a:rPr>
                       <m:t>−1)∗</m:t>
                     </m:r>
@@ -7846,6 +8580,7 @@
                             <a:solidFill>
                               <a:schemeClr val="tx1"/>
                             </a:solidFill>
+                            <a:latin typeface="Cambria Math" panose="02040503050406030204" pitchFamily="18" charset="0"/>
                           </a:rPr>
                         </m:ctrlPr>
                       </m:sSubPr>
@@ -7855,6 +8590,7 @@
                             <a:solidFill>
                               <a:schemeClr val="tx1"/>
                             </a:solidFill>
+                            <a:latin typeface="Cambria Math" panose="02040503050406030204" pitchFamily="18" charset="0"/>
                           </a:rPr>
                           <m:t>𝑢</m:t>
                         </m:r>
@@ -7865,6 +8601,7 @@
                             <a:solidFill>
                               <a:schemeClr val="tx1"/>
                             </a:solidFill>
+                            <a:latin typeface="Cambria Math" panose="02040503050406030204" pitchFamily="18" charset="0"/>
                           </a:rPr>
                           <m:t>𝛼</m:t>
                         </m:r>
@@ -7875,6 +8612,7 @@
                         <a:solidFill>
                           <a:schemeClr val="tx1"/>
                         </a:solidFill>
+                        <a:latin typeface="Cambria Math" panose="02040503050406030204" pitchFamily="18" charset="0"/>
                       </a:rPr>
                       <m:t>), </m:t>
                     </m:r>
@@ -7885,6 +8623,7 @@
                             <a:solidFill>
                               <a:schemeClr val="tx1"/>
                             </a:solidFill>
+                            <a:latin typeface="Cambria Math" panose="02040503050406030204" pitchFamily="18" charset="0"/>
                           </a:rPr>
                         </m:ctrlPr>
                       </m:sSubPr>
@@ -7894,6 +8633,7 @@
                             <a:solidFill>
                               <a:schemeClr val="tx1"/>
                             </a:solidFill>
+                            <a:latin typeface="Cambria Math" panose="02040503050406030204" pitchFamily="18" charset="0"/>
                           </a:rPr>
                           <m:t>𝑦</m:t>
                         </m:r>
@@ -7904,6 +8644,7 @@
                             <a:solidFill>
                               <a:schemeClr val="tx1"/>
                             </a:solidFill>
+                            <a:latin typeface="Cambria Math" panose="02040503050406030204" pitchFamily="18" charset="0"/>
                           </a:rPr>
                           <m:t>𝑝𝑖𝑥𝑒𝑙</m:t>
                         </m:r>
@@ -7914,6 +8655,7 @@
                         <a:solidFill>
                           <a:schemeClr val="tx1"/>
                         </a:solidFill>
+                        <a:latin typeface="Cambria Math" panose="02040503050406030204" pitchFamily="18" charset="0"/>
                       </a:rPr>
                       <m:t>=</m:t>
                     </m:r>
@@ -7924,6 +8666,7 @@
                             <a:solidFill>
                               <a:schemeClr val="tx1"/>
                             </a:solidFill>
+                            <a:latin typeface="Cambria Math" panose="02040503050406030204" pitchFamily="18" charset="0"/>
                           </a:rPr>
                         </m:ctrlPr>
                       </m:sSubPr>
@@ -7933,6 +8676,7 @@
                             <a:solidFill>
                               <a:schemeClr val="tx1"/>
                             </a:solidFill>
+                            <a:latin typeface="Cambria Math" panose="02040503050406030204" pitchFamily="18" charset="0"/>
                           </a:rPr>
                           <m:t>𝑓𝑙𝑜𝑜𝑟</m:t>
                         </m:r>
@@ -7941,6 +8685,7 @@
                             <a:solidFill>
                               <a:schemeClr val="tx1"/>
                             </a:solidFill>
+                            <a:latin typeface="Cambria Math" panose="02040503050406030204" pitchFamily="18" charset="0"/>
                           </a:rPr>
                           <m:t>((</m:t>
                         </m:r>
@@ -7949,6 +8694,7 @@
                             <a:solidFill>
                               <a:schemeClr val="tx1"/>
                             </a:solidFill>
+                            <a:latin typeface="Cambria Math" panose="02040503050406030204" pitchFamily="18" charset="0"/>
                           </a:rPr>
                           <m:t>𝑀</m:t>
                         </m:r>
@@ -7959,6 +8705,7 @@
                             <a:solidFill>
                               <a:schemeClr val="tx1"/>
                             </a:solidFill>
+                            <a:latin typeface="Cambria Math" panose="02040503050406030204" pitchFamily="18" charset="0"/>
                           </a:rPr>
                           <m:t>𝑦</m:t>
                         </m:r>
@@ -7969,6 +8716,7 @@
                         <a:solidFill>
                           <a:schemeClr val="tx1"/>
                         </a:solidFill>
+                        <a:latin typeface="Cambria Math" panose="02040503050406030204" pitchFamily="18" charset="0"/>
                       </a:rPr>
                       <m:t>− 1)∗</m:t>
                     </m:r>
@@ -7979,6 +8727,7 @@
                             <a:solidFill>
                               <a:schemeClr val="tx1"/>
                             </a:solidFill>
+                            <a:latin typeface="Cambria Math" panose="02040503050406030204" pitchFamily="18" charset="0"/>
                           </a:rPr>
                         </m:ctrlPr>
                       </m:sSubPr>
@@ -7988,6 +8737,7 @@
                             <a:solidFill>
                               <a:schemeClr val="tx1"/>
                             </a:solidFill>
+                            <a:latin typeface="Cambria Math" panose="02040503050406030204" pitchFamily="18" charset="0"/>
                           </a:rPr>
                           <m:t>𝑣</m:t>
                         </m:r>
@@ -7998,6 +8748,7 @@
                             <a:solidFill>
                               <a:schemeClr val="tx1"/>
                             </a:solidFill>
+                            <a:latin typeface="Cambria Math" panose="02040503050406030204" pitchFamily="18" charset="0"/>
                           </a:rPr>
                           <m:t>𝛼</m:t>
                         </m:r>
@@ -8008,6 +8759,7 @@
                         <a:solidFill>
                           <a:schemeClr val="tx1"/>
                         </a:solidFill>
+                        <a:latin typeface="Cambria Math" panose="02040503050406030204" pitchFamily="18" charset="0"/>
                       </a:rPr>
                       <m:t>)</m:t>
                     </m:r>
@@ -8076,7 +8828,7 @@
             </p:txBody>
           </p:sp>
         </mc:Choice>
-        <mc:Fallback>
+        <mc:Fallback xmlns="">
           <p:sp>
             <p:nvSpPr>
               <p:cNvPr id="3" name="Объект 2"/>
@@ -8143,6 +8895,35 @@
           </a:ln>
         </p:spPr>
       </p:pic>
+      <p:sp>
+        <p:nvSpPr>
+          <p:cNvPr id="5" name="Номер слайда 4"/>
+          <p:cNvSpPr>
+            <a:spLocks noGrp="1"/>
+          </p:cNvSpPr>
+          <p:nvPr>
+            <p:ph type="sldNum" sz="quarter" idx="12"/>
+          </p:nvPr>
+        </p:nvSpPr>
+        <p:spPr/>
+        <p:txBody>
+          <a:bodyPr/>
+          <a:lstStyle/>
+          <a:p>
+            <a:fld id="{C4F09F00-B2EF-4E92-A50A-EB2934570B6C}" type="slidenum">
+              <a:rPr lang="ru-RU" sz="1800" smtClean="0">
+                <a:latin typeface="Times New Roman" panose="02020603050405020304" pitchFamily="18" charset="0"/>
+                <a:cs typeface="Times New Roman" panose="02020603050405020304" pitchFamily="18" charset="0"/>
+              </a:rPr>
+              <a:t>6</a:t>
+            </a:fld>
+            <a:endParaRPr lang="ru-RU" sz="1800" dirty="0">
+              <a:latin typeface="Times New Roman" panose="02020603050405020304" pitchFamily="18" charset="0"/>
+              <a:cs typeface="Times New Roman" panose="02020603050405020304" pitchFamily="18" charset="0"/>
+            </a:endParaRPr>
+          </a:p>
+        </p:txBody>
+      </p:sp>
     </p:spTree>
     <p:extLst>
       <p:ext uri="{BB962C8B-B14F-4D97-AF65-F5344CB8AC3E}">
@@ -8194,7 +8975,7 @@
                   <a:schemeClr val="tx1"/>
                 </a:solidFill>
               </a:rPr>
-              <a:t>Реализация технологии дополненной реальности</a:t>
+              <a:t>Получение матрицы преобразований</a:t>
             </a:r>
             <a:endParaRPr lang="ru-RU" dirty="0">
               <a:solidFill>
@@ -8206,12 +8987,12 @@
       </p:sp>
       <p:sp>
         <p:nvSpPr>
-          <p:cNvPr id="3" name="Объект 2"/>
-          <p:cNvSpPr>
-            <a:spLocks noGrp="1"/>
-          </p:cNvSpPr>
-          <p:nvPr>
-            <p:ph idx="1"/>
+          <p:cNvPr id="4" name="Номер слайда 3"/>
+          <p:cNvSpPr>
+            <a:spLocks noGrp="1"/>
+          </p:cNvSpPr>
+          <p:nvPr>
+            <p:ph type="sldNum" sz="quarter" idx="12"/>
           </p:nvPr>
         </p:nvSpPr>
         <p:spPr/>
@@ -8219,80 +9000,304 @@
           <a:bodyPr/>
           <a:lstStyle/>
           <a:p>
-            <a:pPr marL="457200" indent="-457200">
-              <a:buFont typeface="+mj-lt"/>
-              <a:buAutoNum type="arabicPeriod"/>
-            </a:pPr>
-            <a:r>
-              <a:rPr lang="ru-RU" dirty="0" smtClean="0">
-                <a:solidFill>
-                  <a:schemeClr val="tx1"/>
-                </a:solidFill>
-              </a:rPr>
-              <a:t>Получить кадр с веб-камеры.</a:t>
-            </a:r>
-          </a:p>
-          <a:p>
-            <a:pPr marL="457200" indent="-457200">
-              <a:buFont typeface="+mj-lt"/>
-              <a:buAutoNum type="arabicPeriod"/>
-            </a:pPr>
-            <a:r>
-              <a:rPr lang="ru-RU" dirty="0" smtClean="0">
-                <a:solidFill>
-                  <a:schemeClr val="tx1"/>
-                </a:solidFill>
-              </a:rPr>
-              <a:t>Определить в нём наличие маркера.</a:t>
-            </a:r>
-          </a:p>
-          <a:p>
-            <a:pPr marL="457200" indent="-457200">
-              <a:buFont typeface="+mj-lt"/>
-              <a:buAutoNum type="arabicPeriod"/>
-            </a:pPr>
-            <a:r>
-              <a:rPr lang="ru-RU" dirty="0" smtClean="0">
-                <a:solidFill>
-                  <a:schemeClr val="tx1"/>
-                </a:solidFill>
-              </a:rPr>
-              <a:t>Если есть, то определить поворот и положение веб-камеры относительно маркера; иначе выдать исходный кадр.</a:t>
-            </a:r>
-          </a:p>
-          <a:p>
-            <a:pPr marL="457200" indent="-457200">
-              <a:buFont typeface="+mj-lt"/>
-              <a:buAutoNum type="arabicPeriod"/>
-            </a:pPr>
-            <a:r>
-              <a:rPr lang="ru-RU" dirty="0" smtClean="0">
-                <a:solidFill>
-                  <a:schemeClr val="tx1"/>
-                </a:solidFill>
-              </a:rPr>
-              <a:t>Получить изображение модели ландшафта, основываясь на полученных данных в предыдущем пункте.</a:t>
-            </a:r>
-          </a:p>
-          <a:p>
-            <a:pPr marL="457200" indent="-457200">
-              <a:buFont typeface="+mj-lt"/>
-              <a:buAutoNum type="arabicPeriod"/>
-            </a:pPr>
-            <a:r>
-              <a:rPr lang="ru-RU" dirty="0" smtClean="0">
-                <a:solidFill>
-                  <a:schemeClr val="tx1"/>
-                </a:solidFill>
-              </a:rPr>
-              <a:t>Наложить изображение модели поверх кадра и выдать результат.</a:t>
-            </a:r>
-          </a:p>
-          <a:p>
-            <a:pPr marL="457200" indent="-457200">
-              <a:buFont typeface="+mj-lt"/>
-              <a:buAutoNum type="arabicPeriod"/>
-            </a:pPr>
+            <a:fld id="{C4F09F00-B2EF-4E92-A50A-EB2934570B6C}" type="slidenum">
+              <a:rPr lang="ru-RU" sz="1800" smtClean="0">
+                <a:latin typeface="Times New Roman" panose="02020603050405020304" pitchFamily="18" charset="0"/>
+                <a:cs typeface="Times New Roman" panose="02020603050405020304" pitchFamily="18" charset="0"/>
+              </a:rPr>
+              <a:t>7</a:t>
+            </a:fld>
+            <a:endParaRPr lang="ru-RU" sz="1800" dirty="0">
+              <a:latin typeface="Times New Roman" panose="02020603050405020304" pitchFamily="18" charset="0"/>
+              <a:cs typeface="Times New Roman" panose="02020603050405020304" pitchFamily="18" charset="0"/>
+            </a:endParaRPr>
+          </a:p>
+        </p:txBody>
+      </p:sp>
+      <p:pic>
+        <p:nvPicPr>
+          <p:cNvPr id="5" name="Picture 2" descr="Annndruha/ArUco_detection - Giters"/>
+          <p:cNvPicPr>
+            <a:picLocks noChangeAspect="1" noChangeArrowheads="1"/>
+          </p:cNvPicPr>
+          <p:nvPr/>
+        </p:nvPicPr>
+        <p:blipFill>
+          <a:blip r:embed="rId2">
+            <a:extLst>
+              <a:ext uri="{28A0092B-C50C-407E-A947-70E740481C1C}">
+                <a14:useLocalDpi xmlns:a14="http://schemas.microsoft.com/office/drawing/2010/main" val="0"/>
+              </a:ext>
+            </a:extLst>
+          </a:blip>
+          <a:srcRect/>
+          <a:stretch>
+            <a:fillRect/>
+          </a:stretch>
+        </p:blipFill>
+        <p:spPr bwMode="auto">
+          <a:xfrm>
+            <a:off x="1471353" y="2772968"/>
+            <a:ext cx="2891856" cy="2168892"/>
+          </a:xfrm>
+          <a:prstGeom prst="rect">
+            <a:avLst/>
+          </a:prstGeom>
+          <a:noFill/>
+          <a:extLst>
+            <a:ext uri="{909E8E84-426E-40DD-AFC4-6F175D3DCCD1}">
+              <a14:hiddenFill xmlns:a14="http://schemas.microsoft.com/office/drawing/2010/main">
+                <a:solidFill>
+                  <a:srgbClr val="FFFFFF"/>
+                </a:solidFill>
+              </a14:hiddenFill>
+            </a:ext>
+          </a:extLst>
+        </p:spPr>
+      </p:pic>
+      <p:cxnSp>
+        <p:nvCxnSpPr>
+          <p:cNvPr id="7" name="Прямая со стрелкой 6"/>
+          <p:cNvCxnSpPr/>
+          <p:nvPr/>
+        </p:nvCxnSpPr>
+        <p:spPr>
+          <a:xfrm>
+            <a:off x="4499264" y="3857414"/>
+            <a:ext cx="3190009" cy="0"/>
+          </a:xfrm>
+          <a:prstGeom prst="straightConnector1">
+            <a:avLst/>
+          </a:prstGeom>
+          <a:ln>
+            <a:tailEnd type="triangle"/>
+          </a:ln>
+        </p:spPr>
+        <p:style>
+          <a:lnRef idx="3">
+            <a:schemeClr val="dk1"/>
+          </a:lnRef>
+          <a:fillRef idx="0">
+            <a:schemeClr val="dk1"/>
+          </a:fillRef>
+          <a:effectRef idx="2">
+            <a:schemeClr val="dk1"/>
+          </a:effectRef>
+          <a:fontRef idx="minor">
+            <a:schemeClr val="tx1"/>
+          </a:fontRef>
+        </p:style>
+      </p:cxnSp>
+      <p:sp>
+        <p:nvSpPr>
+          <p:cNvPr id="9" name="TextBox 8"/>
+          <p:cNvSpPr txBox="1"/>
+          <p:nvPr/>
+        </p:nvSpPr>
+        <p:spPr>
+          <a:xfrm>
+            <a:off x="8895484" y="3502913"/>
+            <a:ext cx="895350" cy="769441"/>
+          </a:xfrm>
+          <a:prstGeom prst="rect">
+            <a:avLst/>
+          </a:prstGeom>
+          <a:noFill/>
+        </p:spPr>
+        <p:txBody>
+          <a:bodyPr wrap="square" rtlCol="0">
+            <a:spAutoFit/>
+          </a:bodyPr>
+          <a:lstStyle/>
+          <a:p>
+            <a:r>
+              <a:rPr lang="en-US" sz="2400" dirty="0" smtClean="0"/>
+              <a:t>R  |  t</a:t>
+            </a:r>
+          </a:p>
+          <a:p>
+            <a:r>
+              <a:rPr lang="en-US" sz="2000" dirty="0" smtClean="0"/>
+              <a:t>0 0 0 1</a:t>
+            </a:r>
+            <a:endParaRPr lang="ru-RU" sz="2000" dirty="0"/>
+          </a:p>
+        </p:txBody>
+      </p:sp>
+      <p:sp>
+        <p:nvSpPr>
+          <p:cNvPr id="10" name="Левая круглая скобка 9"/>
+          <p:cNvSpPr/>
+          <p:nvPr/>
+        </p:nvSpPr>
+        <p:spPr>
+          <a:xfrm>
+            <a:off x="8812357" y="3548522"/>
+            <a:ext cx="83127" cy="678224"/>
+          </a:xfrm>
+          <a:prstGeom prst="leftBracket">
+            <a:avLst/>
+          </a:prstGeom>
+        </p:spPr>
+        <p:style>
+          <a:lnRef idx="3">
+            <a:schemeClr val="dk1"/>
+          </a:lnRef>
+          <a:fillRef idx="0">
+            <a:schemeClr val="dk1"/>
+          </a:fillRef>
+          <a:effectRef idx="2">
+            <a:schemeClr val="dk1"/>
+          </a:effectRef>
+          <a:fontRef idx="minor">
+            <a:schemeClr val="tx1"/>
+          </a:fontRef>
+        </p:style>
+        <p:txBody>
+          <a:bodyPr rtlCol="0" anchor="ctr"/>
+          <a:lstStyle/>
+          <a:p>
+            <a:pPr algn="ctr"/>
+            <a:endParaRPr lang="ru-RU"/>
+          </a:p>
+        </p:txBody>
+      </p:sp>
+      <p:sp>
+        <p:nvSpPr>
+          <p:cNvPr id="11" name="Левая круглая скобка 10"/>
+          <p:cNvSpPr/>
+          <p:nvPr/>
+        </p:nvSpPr>
+        <p:spPr>
+          <a:xfrm rot="10800000">
+            <a:off x="9707707" y="3548522"/>
+            <a:ext cx="83127" cy="678224"/>
+          </a:xfrm>
+          <a:prstGeom prst="leftBracket">
+            <a:avLst/>
+          </a:prstGeom>
+        </p:spPr>
+        <p:style>
+          <a:lnRef idx="3">
+            <a:schemeClr val="dk1"/>
+          </a:lnRef>
+          <a:fillRef idx="0">
+            <a:schemeClr val="dk1"/>
+          </a:fillRef>
+          <a:effectRef idx="2">
+            <a:schemeClr val="dk1"/>
+          </a:effectRef>
+          <a:fontRef idx="minor">
+            <a:schemeClr val="tx1"/>
+          </a:fontRef>
+        </p:style>
+        <p:txBody>
+          <a:bodyPr rtlCol="0" anchor="ctr"/>
+          <a:lstStyle/>
+          <a:p>
+            <a:pPr algn="ctr"/>
+            <a:endParaRPr lang="ru-RU"/>
+          </a:p>
+        </p:txBody>
+      </p:sp>
+      <p:sp>
+        <p:nvSpPr>
+          <p:cNvPr id="12" name="TextBox 11"/>
+          <p:cNvSpPr txBox="1"/>
+          <p:nvPr/>
+        </p:nvSpPr>
+        <p:spPr>
+          <a:xfrm>
+            <a:off x="5705475" y="3518302"/>
+            <a:ext cx="1285875" cy="369332"/>
+          </a:xfrm>
+          <a:prstGeom prst="rect">
+            <a:avLst/>
+          </a:prstGeom>
+          <a:noFill/>
+        </p:spPr>
+        <p:txBody>
+          <a:bodyPr wrap="square" rtlCol="0">
+            <a:spAutoFit/>
+          </a:bodyPr>
+          <a:lstStyle/>
+          <a:p>
+            <a:r>
+              <a:rPr lang="en-US" dirty="0"/>
+              <a:t>r</a:t>
+            </a:r>
+            <a:r>
+              <a:rPr lang="en-US" dirty="0" smtClean="0"/>
+              <a:t>, t</a:t>
+            </a:r>
+            <a:endParaRPr lang="ru-RU" dirty="0"/>
+          </a:p>
+        </p:txBody>
+      </p:sp>
+      <p:sp>
+        <p:nvSpPr>
+          <p:cNvPr id="13" name="TextBox 12"/>
+          <p:cNvSpPr txBox="1"/>
+          <p:nvPr/>
+        </p:nvSpPr>
+        <p:spPr>
+          <a:xfrm>
+            <a:off x="5224842" y="4057468"/>
+            <a:ext cx="1730952" cy="369332"/>
+          </a:xfrm>
+          <a:prstGeom prst="rect">
+            <a:avLst/>
+          </a:prstGeom>
+          <a:noFill/>
+        </p:spPr>
+        <p:txBody>
+          <a:bodyPr wrap="square" rtlCol="0">
+            <a:spAutoFit/>
+          </a:bodyPr>
+          <a:lstStyle/>
+          <a:p>
+            <a:r>
+              <a:rPr lang="en-US" dirty="0" smtClean="0"/>
+              <a:t>R = Rodrigues(r)</a:t>
+            </a:r>
+            <a:endParaRPr lang="en-US" dirty="0"/>
+          </a:p>
+        </p:txBody>
+      </p:sp>
+      <p:sp>
+        <p:nvSpPr>
+          <p:cNvPr id="14" name="TextBox 13"/>
+          <p:cNvSpPr txBox="1"/>
+          <p:nvPr/>
+        </p:nvSpPr>
+        <p:spPr>
+          <a:xfrm>
+            <a:off x="7773159" y="3689604"/>
+            <a:ext cx="1122325" cy="369332"/>
+          </a:xfrm>
+          <a:prstGeom prst="rect">
+            <a:avLst/>
+          </a:prstGeom>
+          <a:noFill/>
+        </p:spPr>
+        <p:txBody>
+          <a:bodyPr wrap="square" rtlCol="0">
+            <a:spAutoFit/>
+          </a:bodyPr>
+          <a:lstStyle/>
+          <a:p>
+            <a:r>
+              <a:rPr lang="en-US" dirty="0" smtClean="0"/>
+              <a:t>M</a:t>
+            </a:r>
+            <a:r>
+              <a:rPr lang="ru-RU" baseline="-25000" dirty="0" err="1" smtClean="0"/>
+              <a:t>преобр</a:t>
+            </a:r>
+            <a:r>
+              <a:rPr lang="en-US" dirty="0" smtClean="0"/>
+              <a:t> =</a:t>
+            </a:r>
             <a:endParaRPr lang="ru-RU" dirty="0"/>
           </a:p>
         </p:txBody>
@@ -8300,7 +9305,7 @@
     </p:spTree>
     <p:extLst>
       <p:ext uri="{BB962C8B-B14F-4D97-AF65-F5344CB8AC3E}">
-        <p14:creationId xmlns:p14="http://schemas.microsoft.com/office/powerpoint/2010/main" val="4077157964"/>
+        <p14:creationId xmlns:p14="http://schemas.microsoft.com/office/powerpoint/2010/main" val="4021000691"/>
       </p:ext>
     </p:extLst>
   </p:cSld>
@@ -8348,7 +9353,7 @@
                   <a:schemeClr val="tx1"/>
                 </a:solidFill>
               </a:rPr>
-              <a:t>Структура комплекса программ</a:t>
+              <a:t>Синтез реального и виртуального изображения</a:t>
             </a:r>
             <a:endParaRPr lang="ru-RU" dirty="0">
               <a:solidFill>
@@ -8360,12 +9365,12 @@
       </p:sp>
       <p:sp>
         <p:nvSpPr>
-          <p:cNvPr id="3" name="Объект 2"/>
-          <p:cNvSpPr>
-            <a:spLocks noGrp="1"/>
-          </p:cNvSpPr>
-          <p:nvPr>
-            <p:ph idx="1"/>
+          <p:cNvPr id="4" name="Номер слайда 3"/>
+          <p:cNvSpPr>
+            <a:spLocks noGrp="1"/>
+          </p:cNvSpPr>
+          <p:nvPr>
+            <p:ph type="sldNum" sz="quarter" idx="12"/>
           </p:nvPr>
         </p:nvSpPr>
         <p:spPr/>
@@ -8373,99 +9378,161 @@
           <a:bodyPr/>
           <a:lstStyle/>
           <a:p>
-            <a:r>
-              <a:rPr lang="ru-RU" dirty="0" smtClean="0">
-                <a:solidFill>
-                  <a:schemeClr val="tx1"/>
-                </a:solidFill>
-              </a:rPr>
-              <a:t>Программное обеспечение состоит из трёх частей:</a:t>
-            </a:r>
-          </a:p>
-          <a:p>
-            <a:pPr lvl="1"/>
-            <a:r>
-              <a:rPr lang="en-US" dirty="0" smtClean="0">
-                <a:solidFill>
-                  <a:schemeClr val="tx1"/>
-                </a:solidFill>
-              </a:rPr>
-              <a:t>UI – </a:t>
-            </a:r>
-            <a:r>
-              <a:rPr lang="ru-RU" dirty="0" smtClean="0">
-                <a:solidFill>
-                  <a:schemeClr val="tx1"/>
-                </a:solidFill>
-              </a:rPr>
-              <a:t>интерфейс программы;</a:t>
-            </a:r>
-          </a:p>
-          <a:p>
-            <a:pPr lvl="1"/>
-            <a:r>
-              <a:rPr lang="en-US" dirty="0" err="1" smtClean="0">
-                <a:solidFill>
-                  <a:schemeClr val="tx1"/>
-                </a:solidFill>
-              </a:rPr>
-              <a:t>HeightMapLib</a:t>
-            </a:r>
-            <a:r>
-              <a:rPr lang="en-US" dirty="0" smtClean="0">
-                <a:solidFill>
-                  <a:schemeClr val="tx1"/>
-                </a:solidFill>
-              </a:rPr>
-              <a:t> – </a:t>
-            </a:r>
-            <a:r>
-              <a:rPr lang="ru-RU" dirty="0" smtClean="0">
-                <a:solidFill>
-                  <a:schemeClr val="tx1"/>
-                </a:solidFill>
-              </a:rPr>
-              <a:t>библиотека, содержащая алгоритмы генерации и обработки карты высот;</a:t>
-            </a:r>
-          </a:p>
-          <a:p>
-            <a:pPr lvl="1"/>
-            <a:r>
-              <a:rPr lang="en-US" dirty="0" err="1" smtClean="0">
-                <a:solidFill>
-                  <a:schemeClr val="tx1"/>
-                </a:solidFill>
-              </a:rPr>
-              <a:t>RenderLib</a:t>
-            </a:r>
-            <a:r>
-              <a:rPr lang="en-US" dirty="0" smtClean="0">
-                <a:solidFill>
-                  <a:schemeClr val="tx1"/>
-                </a:solidFill>
-              </a:rPr>
-              <a:t> – </a:t>
-            </a:r>
-            <a:r>
-              <a:rPr lang="ru-RU" dirty="0" smtClean="0">
-                <a:solidFill>
-                  <a:schemeClr val="tx1"/>
-                </a:solidFill>
-              </a:rPr>
-              <a:t>библиотека, содержащая алгоритмы компьютерной графики.</a:t>
-            </a:r>
-            <a:endParaRPr lang="ru-RU" dirty="0">
-              <a:solidFill>
-                <a:schemeClr val="tx1"/>
-              </a:solidFill>
+            <a:fld id="{C4F09F00-B2EF-4E92-A50A-EB2934570B6C}" type="slidenum">
+              <a:rPr lang="ru-RU" sz="1800" smtClean="0">
+                <a:latin typeface="Times New Roman" panose="02020603050405020304" pitchFamily="18" charset="0"/>
+                <a:cs typeface="Times New Roman" panose="02020603050405020304" pitchFamily="18" charset="0"/>
+              </a:rPr>
+              <a:t>8</a:t>
+            </a:fld>
+            <a:endParaRPr lang="ru-RU" sz="1800" dirty="0">
+              <a:latin typeface="Times New Roman" panose="02020603050405020304" pitchFamily="18" charset="0"/>
+              <a:cs typeface="Times New Roman" panose="02020603050405020304" pitchFamily="18" charset="0"/>
             </a:endParaRPr>
           </a:p>
         </p:txBody>
       </p:sp>
+      <p:pic>
+        <p:nvPicPr>
+          <p:cNvPr id="5" name="Рисунок 4"/>
+          <p:cNvPicPr>
+            <a:picLocks noChangeAspect="1"/>
+          </p:cNvPicPr>
+          <p:nvPr/>
+        </p:nvPicPr>
+        <p:blipFill rotWithShape="1">
+          <a:blip r:embed="rId2">
+            <a:extLst>
+              <a:ext uri="{28A0092B-C50C-407E-A947-70E740481C1C}">
+                <a14:useLocalDpi xmlns:a14="http://schemas.microsoft.com/office/drawing/2010/main" val="0"/>
+              </a:ext>
+            </a:extLst>
+          </a:blip>
+          <a:srcRect t="1" r="2910" b="40050"/>
+          <a:stretch/>
+        </p:blipFill>
+        <p:spPr>
+          <a:xfrm>
+            <a:off x="1459638" y="2993665"/>
+            <a:ext cx="2710731" cy="1673784"/>
+          </a:xfrm>
+          <a:prstGeom prst="rect">
+            <a:avLst/>
+          </a:prstGeom>
+          <a:ln w="38100" cap="sq">
+            <a:solidFill>
+              <a:srgbClr val="000000"/>
+            </a:solidFill>
+            <a:prstDash val="solid"/>
+            <a:miter lim="800000"/>
+          </a:ln>
+          <a:effectLst>
+            <a:outerShdw blurRad="50800" dist="38100" dir="2700000" algn="tl" rotWithShape="0">
+              <a:srgbClr val="000000">
+                <a:alpha val="43000"/>
+              </a:srgbClr>
+            </a:outerShdw>
+          </a:effectLst>
+        </p:spPr>
+      </p:pic>
+      <p:cxnSp>
+        <p:nvCxnSpPr>
+          <p:cNvPr id="8" name="Прямая со стрелкой 7"/>
+          <p:cNvCxnSpPr/>
+          <p:nvPr/>
+        </p:nvCxnSpPr>
+        <p:spPr>
+          <a:xfrm>
+            <a:off x="4415481" y="3804294"/>
+            <a:ext cx="1935892" cy="0"/>
+          </a:xfrm>
+          <a:prstGeom prst="straightConnector1">
+            <a:avLst/>
+          </a:prstGeom>
+          <a:ln>
+            <a:solidFill>
+              <a:schemeClr val="tx1"/>
+            </a:solidFill>
+            <a:tailEnd type="triangle"/>
+          </a:ln>
+        </p:spPr>
+        <p:style>
+          <a:lnRef idx="1">
+            <a:schemeClr val="accent1"/>
+          </a:lnRef>
+          <a:fillRef idx="0">
+            <a:schemeClr val="accent1"/>
+          </a:fillRef>
+          <a:effectRef idx="0">
+            <a:schemeClr val="accent1"/>
+          </a:effectRef>
+          <a:fontRef idx="minor">
+            <a:schemeClr val="tx1"/>
+          </a:fontRef>
+        </p:style>
+      </p:cxnSp>
+      <p:sp>
+        <p:nvSpPr>
+          <p:cNvPr id="9" name="TextBox 8"/>
+          <p:cNvSpPr txBox="1"/>
+          <p:nvPr/>
+        </p:nvSpPr>
+        <p:spPr>
+          <a:xfrm>
+            <a:off x="4885037" y="3426941"/>
+            <a:ext cx="902697" cy="377353"/>
+          </a:xfrm>
+          <a:prstGeom prst="rect">
+            <a:avLst/>
+          </a:prstGeom>
+          <a:noFill/>
+        </p:spPr>
+        <p:txBody>
+          <a:bodyPr wrap="square" rtlCol="0">
+            <a:spAutoFit/>
+          </a:bodyPr>
+          <a:lstStyle/>
+          <a:p>
+            <a:r>
+              <a:rPr lang="en-US" dirty="0" smtClean="0"/>
+              <a:t>M</a:t>
+            </a:r>
+            <a:r>
+              <a:rPr lang="ru-RU" baseline="-25000" dirty="0" err="1" smtClean="0"/>
+              <a:t>преобр</a:t>
+            </a:r>
+            <a:endParaRPr lang="ru-RU" dirty="0"/>
+          </a:p>
+        </p:txBody>
+      </p:sp>
+      <p:pic>
+        <p:nvPicPr>
+          <p:cNvPr id="10" name="Рисунок 9"/>
+          <p:cNvPicPr>
+            <a:picLocks noChangeAspect="1"/>
+          </p:cNvPicPr>
+          <p:nvPr/>
+        </p:nvPicPr>
+        <p:blipFill>
+          <a:blip r:embed="rId3"/>
+          <a:stretch>
+            <a:fillRect/>
+          </a:stretch>
+        </p:blipFill>
+        <p:spPr>
+          <a:xfrm>
+            <a:off x="6513296" y="2496404"/>
+            <a:ext cx="3561880" cy="2668307"/>
+          </a:xfrm>
+          <a:prstGeom prst="rect">
+            <a:avLst/>
+          </a:prstGeom>
+        </p:spPr>
+      </p:pic>
     </p:spTree>
     <p:extLst>
       <p:ext uri="{BB962C8B-B14F-4D97-AF65-F5344CB8AC3E}">
-        <p14:creationId xmlns:p14="http://schemas.microsoft.com/office/powerpoint/2010/main" val="3400921614"/>
+        <p14:creationId xmlns:p14="http://schemas.microsoft.com/office/powerpoint/2010/main" val="4077157964"/>
       </p:ext>
     </p:extLst>
   </p:cSld>
@@ -8504,7 +9571,9 @@
         </p:nvSpPr>
         <p:spPr/>
         <p:txBody>
-          <a:bodyPr/>
+          <a:bodyPr>
+            <a:normAutofit/>
+          </a:bodyPr>
           <a:lstStyle/>
           <a:p>
             <a:r>
@@ -8513,23 +9582,7 @@
                   <a:schemeClr val="tx1"/>
                 </a:solidFill>
               </a:rPr>
-              <a:t>Интерфейс программы</a:t>
-            </a:r>
-            <a:r>
-              <a:rPr lang="en-US" dirty="0" smtClean="0">
-                <a:solidFill>
-                  <a:schemeClr val="tx1"/>
-                </a:solidFill>
-              </a:rPr>
-              <a:t> (</a:t>
-            </a:r>
-            <a:r>
-              <a:rPr lang="ru-RU" dirty="0" smtClean="0">
-                <a:solidFill>
-                  <a:schemeClr val="tx1"/>
-                </a:solidFill>
-              </a:rPr>
-              <a:t>часть 1)</a:t>
+              <a:t>Схема синтеза реального и виртуального изображения</a:t>
             </a:r>
             <a:endParaRPr lang="ru-RU" dirty="0">
               <a:solidFill>
@@ -8541,123 +9594,42 @@
       </p:sp>
       <p:sp>
         <p:nvSpPr>
-          <p:cNvPr id="3" name="Объект 2"/>
-          <p:cNvSpPr>
-            <a:spLocks noGrp="1"/>
-          </p:cNvSpPr>
-          <p:nvPr>
-            <p:ph idx="1"/>
+          <p:cNvPr id="4" name="Номер слайда 3"/>
+          <p:cNvSpPr>
+            <a:spLocks noGrp="1"/>
+          </p:cNvSpPr>
+          <p:nvPr>
+            <p:ph type="sldNum" sz="quarter" idx="12"/>
           </p:nvPr>
         </p:nvSpPr>
         <p:spPr/>
         <p:txBody>
-          <a:bodyPr rIns="3600000">
-            <a:normAutofit/>
-          </a:bodyPr>
+          <a:bodyPr/>
           <a:lstStyle/>
           <a:p>
-            <a:pPr lvl="1"/>
-            <a:r>
-              <a:rPr lang="ru-RU" sz="2000" dirty="0">
-                <a:solidFill>
-                  <a:schemeClr val="tx1"/>
-                </a:solidFill>
-              </a:rPr>
-              <a:t>группа «Создание карты высот» – позволяет задать </a:t>
-            </a:r>
-            <a:r>
-              <a:rPr lang="ru-RU" sz="2000" dirty="0" smtClean="0">
-                <a:solidFill>
-                  <a:schemeClr val="tx1"/>
-                </a:solidFill>
-              </a:rPr>
-              <a:t>параметры </a:t>
-            </a:r>
-            <a:r>
-              <a:rPr lang="ru-RU" sz="2000" dirty="0">
-                <a:solidFill>
-                  <a:schemeClr val="tx1"/>
-                </a:solidFill>
-              </a:rPr>
-              <a:t>генерации карты высот;</a:t>
-            </a:r>
-          </a:p>
-          <a:p>
-            <a:pPr lvl="1"/>
-            <a:r>
-              <a:rPr lang="ru-RU" sz="2000" dirty="0">
-                <a:solidFill>
-                  <a:schemeClr val="tx1"/>
-                </a:solidFill>
-              </a:rPr>
-              <a:t>группа «Изображение маркера» – позволяет получить изображение маркера как файл с изображением</a:t>
-            </a:r>
-            <a:r>
-              <a:rPr lang="ru-RU" sz="2000" dirty="0" smtClean="0">
-                <a:solidFill>
-                  <a:schemeClr val="tx1"/>
-                </a:solidFill>
-              </a:rPr>
-              <a:t>;</a:t>
-            </a:r>
-            <a:endParaRPr lang="en-US" sz="2000" dirty="0" smtClean="0">
-              <a:solidFill>
-                <a:schemeClr val="tx1"/>
-              </a:solidFill>
+            <a:fld id="{C4F09F00-B2EF-4E92-A50A-EB2934570B6C}" type="slidenum">
+              <a:rPr lang="ru-RU" sz="1800" smtClean="0">
+                <a:latin typeface="Times New Roman" panose="02020603050405020304" pitchFamily="18" charset="0"/>
+                <a:cs typeface="Times New Roman" panose="02020603050405020304" pitchFamily="18" charset="0"/>
+              </a:rPr>
+              <a:t>9</a:t>
+            </a:fld>
+            <a:endParaRPr lang="ru-RU" sz="1800" dirty="0">
+              <a:latin typeface="Times New Roman" panose="02020603050405020304" pitchFamily="18" charset="0"/>
+              <a:cs typeface="Times New Roman" panose="02020603050405020304" pitchFamily="18" charset="0"/>
             </a:endParaRPr>
-          </a:p>
-          <a:p>
-            <a:pPr lvl="1"/>
-            <a:r>
-              <a:rPr lang="ru-RU" sz="2000" dirty="0">
-                <a:solidFill>
-                  <a:schemeClr val="tx1"/>
-                </a:solidFill>
-              </a:rPr>
-              <a:t>группа «Статус карты высот» – позволяет задать размер видимой части ландшафта, после чего создаётся модель видимой части ландшафта, и контролировать наличие этапа обработки </a:t>
-            </a:r>
-            <a:r>
-              <a:rPr lang="ru-RU" sz="2000" dirty="0" smtClean="0">
-                <a:solidFill>
-                  <a:schemeClr val="tx1"/>
-                </a:solidFill>
-              </a:rPr>
-              <a:t>теней</a:t>
-            </a:r>
-            <a:r>
-              <a:rPr lang="en-US" sz="2000" dirty="0">
-                <a:solidFill>
-                  <a:schemeClr val="tx1"/>
-                </a:solidFill>
-              </a:rPr>
-              <a:t>.</a:t>
-            </a:r>
-            <a:endParaRPr lang="ru-RU" sz="2000" dirty="0">
-              <a:solidFill>
-                <a:schemeClr val="tx1"/>
-              </a:solidFill>
-            </a:endParaRPr>
-          </a:p>
-          <a:p>
-            <a:pPr lvl="1"/>
-            <a:endParaRPr lang="ru-RU" sz="2000" dirty="0">
-              <a:solidFill>
-                <a:schemeClr val="tx1"/>
-              </a:solidFill>
-            </a:endParaRPr>
-          </a:p>
-          <a:p>
-            <a:endParaRPr lang="ru-RU" dirty="0"/>
           </a:p>
         </p:txBody>
       </p:sp>
       <p:pic>
         <p:nvPicPr>
-          <p:cNvPr id="6" name="Рисунок 5"/>
+          <p:cNvPr id="5" name="Объект 4"/>
           <p:cNvPicPr>
-            <a:picLocks noChangeAspect="1"/>
+            <a:picLocks noGrp="1"/>
           </p:cNvPicPr>
-          <p:nvPr/>
+          <p:nvPr>
+            <p:ph idx="1"/>
+          </p:nvPr>
         </p:nvPicPr>
         <p:blipFill rotWithShape="1">
           <a:blip r:embed="rId2">
@@ -8667,23 +9639,31 @@
               </a:ext>
             </a:extLst>
           </a:blip>
-          <a:srcRect r="51478"/>
+          <a:srcRect r="3369"/>
           <a:stretch/>
         </p:blipFill>
-        <p:spPr>
+        <p:spPr bwMode="auto">
           <a:xfrm>
-            <a:off x="7570817" y="1845734"/>
-            <a:ext cx="3584863" cy="3730289"/>
+            <a:off x="3207110" y="1846263"/>
+            <a:ext cx="5838105" cy="4022725"/>
           </a:xfrm>
           <a:prstGeom prst="rect">
             <a:avLst/>
           </a:prstGeom>
+          <a:ln>
+            <a:noFill/>
+          </a:ln>
+          <a:extLst>
+            <a:ext uri="{53640926-AAD7-44D8-BBD7-CCE9431645EC}">
+              <a14:shadowObscured xmlns:a14="http://schemas.microsoft.com/office/drawing/2010/main"/>
+            </a:ext>
+          </a:extLst>
         </p:spPr>
       </p:pic>
     </p:spTree>
     <p:extLst>
       <p:ext uri="{BB962C8B-B14F-4D97-AF65-F5344CB8AC3E}">
-        <p14:creationId xmlns:p14="http://schemas.microsoft.com/office/powerpoint/2010/main" val="2313457748"/>
+        <p14:creationId xmlns:p14="http://schemas.microsoft.com/office/powerpoint/2010/main" val="2922407050"/>
       </p:ext>
     </p:extLst>
   </p:cSld>
@@ -8974,4 +9954,265 @@
     </a:ext>
   </a:extLst>
 </a:theme>
+</file>
+
+<file path=ppt/theme/theme2.xml><?xml version="1.0" encoding="utf-8"?>
+<a:theme xmlns:a="http://schemas.openxmlformats.org/drawingml/2006/main" name="Тема Office">
+  <a:themeElements>
+    <a:clrScheme name="Стандартная">
+      <a:dk1>
+        <a:sysClr val="windowText" lastClr="000000"/>
+      </a:dk1>
+      <a:lt1>
+        <a:sysClr val="window" lastClr="FFFFFF"/>
+      </a:lt1>
+      <a:dk2>
+        <a:srgbClr val="44546A"/>
+      </a:dk2>
+      <a:lt2>
+        <a:srgbClr val="E7E6E6"/>
+      </a:lt2>
+      <a:accent1>
+        <a:srgbClr val="5B9BD5"/>
+      </a:accent1>
+      <a:accent2>
+        <a:srgbClr val="ED7D31"/>
+      </a:accent2>
+      <a:accent3>
+        <a:srgbClr val="A5A5A5"/>
+      </a:accent3>
+      <a:accent4>
+        <a:srgbClr val="FFC000"/>
+      </a:accent4>
+      <a:accent5>
+        <a:srgbClr val="4472C4"/>
+      </a:accent5>
+      <a:accent6>
+        <a:srgbClr val="70AD47"/>
+      </a:accent6>
+      <a:hlink>
+        <a:srgbClr val="0563C1"/>
+      </a:hlink>
+      <a:folHlink>
+        <a:srgbClr val="954F72"/>
+      </a:folHlink>
+    </a:clrScheme>
+    <a:fontScheme name="Стандартная">
+      <a:majorFont>
+        <a:latin typeface="Calibri Light" panose="020F0302020204030204"/>
+        <a:ea typeface=""/>
+        <a:cs typeface=""/>
+        <a:font script="Jpan" typeface="ＭＳ Ｐゴシック"/>
+        <a:font script="Hang" typeface="맑은 고딕"/>
+        <a:font script="Hans" typeface="宋体"/>
+        <a:font script="Hant" typeface="新細明體"/>
+        <a:font script="Arab" typeface="Times New Roman"/>
+        <a:font script="Hebr" typeface="Times New Roman"/>
+        <a:font script="Thai" typeface="Angsana New"/>
+        <a:font script="Ethi" typeface="Nyala"/>
+        <a:font script="Beng" typeface="Vrinda"/>
+        <a:font script="Gujr" typeface="Shruti"/>
+        <a:font script="Khmr" typeface="MoolBoran"/>
+        <a:font script="Knda" typeface="Tunga"/>
+        <a:font script="Guru" typeface="Raavi"/>
+        <a:font script="Cans" typeface="Euphemia"/>
+        <a:font script="Cher" typeface="Plantagenet Cherokee"/>
+        <a:font script="Yiii" typeface="Microsoft Yi Baiti"/>
+        <a:font script="Tibt" typeface="Microsoft Himalaya"/>
+        <a:font script="Thaa" typeface="MV Boli"/>
+        <a:font script="Deva" typeface="Mangal"/>
+        <a:font script="Telu" typeface="Gautami"/>
+        <a:font script="Taml" typeface="Latha"/>
+        <a:font script="Syrc" typeface="Estrangelo Edessa"/>
+        <a:font script="Orya" typeface="Kalinga"/>
+        <a:font script="Mlym" typeface="Kartika"/>
+        <a:font script="Laoo" typeface="DokChampa"/>
+        <a:font script="Sinh" typeface="Iskoola Pota"/>
+        <a:font script="Mong" typeface="Mongolian Baiti"/>
+        <a:font script="Viet" typeface="Times New Roman"/>
+        <a:font script="Uigh" typeface="Microsoft Uighur"/>
+        <a:font script="Geor" typeface="Sylfaen"/>
+      </a:majorFont>
+      <a:minorFont>
+        <a:latin typeface="Calibri" panose="020F0502020204030204"/>
+        <a:ea typeface=""/>
+        <a:cs typeface=""/>
+        <a:font script="Jpan" typeface="ＭＳ Ｐゴシック"/>
+        <a:font script="Hang" typeface="맑은 고딕"/>
+        <a:font script="Hans" typeface="宋体"/>
+        <a:font script="Hant" typeface="新細明體"/>
+        <a:font script="Arab" typeface="Arial"/>
+        <a:font script="Hebr" typeface="Arial"/>
+        <a:font script="Thai" typeface="Cordia New"/>
+        <a:font script="Ethi" typeface="Nyala"/>
+        <a:font script="Beng" typeface="Vrinda"/>
+        <a:font script="Gujr" typeface="Shruti"/>
+        <a:font script="Khmr" typeface="DaunPenh"/>
+        <a:font script="Knda" typeface="Tunga"/>
+        <a:font script="Guru" typeface="Raavi"/>
+        <a:font script="Cans" typeface="Euphemia"/>
+        <a:font script="Cher" typeface="Plantagenet Cherokee"/>
+        <a:font script="Yiii" typeface="Microsoft Yi Baiti"/>
+        <a:font script="Tibt" typeface="Microsoft Himalaya"/>
+        <a:font script="Thaa" typeface="MV Boli"/>
+        <a:font script="Deva" typeface="Mangal"/>
+        <a:font script="Telu" typeface="Gautami"/>
+        <a:font script="Taml" typeface="Latha"/>
+        <a:font script="Syrc" typeface="Estrangelo Edessa"/>
+        <a:font script="Orya" typeface="Kalinga"/>
+        <a:font script="Mlym" typeface="Kartika"/>
+        <a:font script="Laoo" typeface="DokChampa"/>
+        <a:font script="Sinh" typeface="Iskoola Pota"/>
+        <a:font script="Mong" typeface="Mongolian Baiti"/>
+        <a:font script="Viet" typeface="Arial"/>
+        <a:font script="Uigh" typeface="Microsoft Uighur"/>
+        <a:font script="Geor" typeface="Sylfaen"/>
+      </a:minorFont>
+    </a:fontScheme>
+    <a:fmtScheme name="Стандартная">
+      <a:fillStyleLst>
+        <a:solidFill>
+          <a:schemeClr val="phClr"/>
+        </a:solidFill>
+        <a:gradFill rotWithShape="1">
+          <a:gsLst>
+            <a:gs pos="0">
+              <a:schemeClr val="phClr">
+                <a:lumMod val="110000"/>
+                <a:satMod val="105000"/>
+                <a:tint val="67000"/>
+              </a:schemeClr>
+            </a:gs>
+            <a:gs pos="50000">
+              <a:schemeClr val="phClr">
+                <a:lumMod val="105000"/>
+                <a:satMod val="103000"/>
+                <a:tint val="73000"/>
+              </a:schemeClr>
+            </a:gs>
+            <a:gs pos="100000">
+              <a:schemeClr val="phClr">
+                <a:lumMod val="105000"/>
+                <a:satMod val="109000"/>
+                <a:tint val="81000"/>
+              </a:schemeClr>
+            </a:gs>
+          </a:gsLst>
+          <a:lin ang="5400000" scaled="0"/>
+        </a:gradFill>
+        <a:gradFill rotWithShape="1">
+          <a:gsLst>
+            <a:gs pos="0">
+              <a:schemeClr val="phClr">
+                <a:satMod val="103000"/>
+                <a:lumMod val="102000"/>
+                <a:tint val="94000"/>
+              </a:schemeClr>
+            </a:gs>
+            <a:gs pos="50000">
+              <a:schemeClr val="phClr">
+                <a:satMod val="110000"/>
+                <a:lumMod val="100000"/>
+                <a:shade val="100000"/>
+              </a:schemeClr>
+            </a:gs>
+            <a:gs pos="100000">
+              <a:schemeClr val="phClr">
+                <a:lumMod val="99000"/>
+                <a:satMod val="120000"/>
+                <a:shade val="78000"/>
+              </a:schemeClr>
+            </a:gs>
+          </a:gsLst>
+          <a:lin ang="5400000" scaled="0"/>
+        </a:gradFill>
+      </a:fillStyleLst>
+      <a:lnStyleLst>
+        <a:ln w="6350" cap="flat" cmpd="sng" algn="ctr">
+          <a:solidFill>
+            <a:schemeClr val="phClr"/>
+          </a:solidFill>
+          <a:prstDash val="solid"/>
+          <a:miter lim="800000"/>
+        </a:ln>
+        <a:ln w="12700" cap="flat" cmpd="sng" algn="ctr">
+          <a:solidFill>
+            <a:schemeClr val="phClr"/>
+          </a:solidFill>
+          <a:prstDash val="solid"/>
+          <a:miter lim="800000"/>
+        </a:ln>
+        <a:ln w="19050" cap="flat" cmpd="sng" algn="ctr">
+          <a:solidFill>
+            <a:schemeClr val="phClr"/>
+          </a:solidFill>
+          <a:prstDash val="solid"/>
+          <a:miter lim="800000"/>
+        </a:ln>
+      </a:lnStyleLst>
+      <a:effectStyleLst>
+        <a:effectStyle>
+          <a:effectLst/>
+        </a:effectStyle>
+        <a:effectStyle>
+          <a:effectLst/>
+        </a:effectStyle>
+        <a:effectStyle>
+          <a:effectLst>
+            <a:outerShdw blurRad="57150" dist="19050" dir="5400000" algn="ctr" rotWithShape="0">
+              <a:srgbClr val="000000">
+                <a:alpha val="63000"/>
+              </a:srgbClr>
+            </a:outerShdw>
+          </a:effectLst>
+        </a:effectStyle>
+      </a:effectStyleLst>
+      <a:bgFillStyleLst>
+        <a:solidFill>
+          <a:schemeClr val="phClr"/>
+        </a:solidFill>
+        <a:solidFill>
+          <a:schemeClr val="phClr">
+            <a:tint val="95000"/>
+            <a:satMod val="170000"/>
+          </a:schemeClr>
+        </a:solidFill>
+        <a:gradFill rotWithShape="1">
+          <a:gsLst>
+            <a:gs pos="0">
+              <a:schemeClr val="phClr">
+                <a:tint val="93000"/>
+                <a:satMod val="150000"/>
+                <a:shade val="98000"/>
+                <a:lumMod val="102000"/>
+              </a:schemeClr>
+            </a:gs>
+            <a:gs pos="50000">
+              <a:schemeClr val="phClr">
+                <a:tint val="98000"/>
+                <a:satMod val="130000"/>
+                <a:shade val="90000"/>
+                <a:lumMod val="103000"/>
+              </a:schemeClr>
+            </a:gs>
+            <a:gs pos="100000">
+              <a:schemeClr val="phClr">
+                <a:shade val="63000"/>
+                <a:satMod val="120000"/>
+              </a:schemeClr>
+            </a:gs>
+          </a:gsLst>
+          <a:lin ang="5400000" scaled="0"/>
+        </a:gradFill>
+      </a:bgFillStyleLst>
+    </a:fmtScheme>
+  </a:themeElements>
+  <a:objectDefaults/>
+  <a:extraClrSchemeLst/>
+  <a:extLst>
+    <a:ext uri="{05A4C25C-085E-4340-85A3-A5531E510DB2}">
+      <thm15:themeFamily xmlns:thm15="http://schemas.microsoft.com/office/thememl/2012/main" name="Office Theme" id="{62F939B6-93AF-4DB8-9C6B-D6C7DFDC589F}" vid="{4A3C46E8-61CC-4603-A589-7422A47A8E4A}"/>
+    </a:ext>
+  </a:extLst>
+</a:theme>
 </file>
</xml_diff>